<commit_message>
ppt use case updtaed
</commit_message>
<xml_diff>
--- a/Documents/AgroCraft.pptx
+++ b/Documents/AgroCraft.pptx
@@ -1,6 +1,6 @@
 
 <file path=ppt/presentation.xml><?xml version="1.0" encoding="utf-8"?>
-<p:presentation xmlns:a="http://schemas.openxmlformats.org/drawingml/2006/main" xmlns:r="http://schemas.openxmlformats.org/officeDocument/2006/relationships" xmlns:p="http://schemas.openxmlformats.org/presentationml/2006/main" saveSubsetFonts="1">
+<p:presentation xmlns:a="http://schemas.openxmlformats.org/drawingml/2006/main" xmlns:r="http://schemas.openxmlformats.org/officeDocument/2006/relationships" xmlns:p="http://schemas.openxmlformats.org/presentationml/2006/main">
   <p:sldMasterIdLst>
     <p:sldMasterId id="2147483648" r:id="rId1"/>
   </p:sldMasterIdLst>
@@ -8,9 +8,9 @@
     <p:notesMasterId r:id="rId5"/>
   </p:notesMasterIdLst>
   <p:sldIdLst>
-    <p:sldId id="256" r:id="rId2"/>
-    <p:sldId id="260" r:id="rId3"/>
-    <p:sldId id="261" r:id="rId4"/>
+    <p:sldId id="256" r:id="rId3"/>
+    <p:sldId id="260" r:id="rId4"/>
+    <p:sldId id="261" r:id="rId6"/>
   </p:sldIdLst>
   <p:sldSz cx="12192000" cy="6858000"/>
   <p:notesSz cx="6858000" cy="9144000"/>
@@ -109,11 +109,6 @@
       </a:defRPr>
     </a:lvl9pPr>
   </p:defaultTextStyle>
-  <p:extLst>
-    <p:ext uri="{EFAFB233-063F-42B5-8137-9DF3F51BA10A}">
-      <p15:sldGuideLst xmlns:p15="http://schemas.microsoft.com/office/powerpoint/2012/main"/>
-    </p:ext>
-  </p:extLst>
 </p:presentation>
 </file>
 
@@ -199,7 +194,6 @@
           <a:p>
             <a:fld id="{FB089754-874B-41D7-BB2F-E715C6ACB985}" type="datetimeFigureOut">
               <a:rPr lang="en-IN" smtClean="0"/>
-              <a:t>25-01-2020</a:t>
             </a:fld>
             <a:endParaRPr lang="en-IN"/>
           </a:p>
@@ -266,6 +260,7 @@
               <a:rPr lang="en-US"/>
               <a:t>Click to edit Master text styles</a:t>
             </a:r>
+            <a:endParaRPr lang="en-US"/>
           </a:p>
           <a:p>
             <a:pPr lvl="1"/>
@@ -273,6 +268,7 @@
               <a:rPr lang="en-US"/>
               <a:t>Second level</a:t>
             </a:r>
+            <a:endParaRPr lang="en-US"/>
           </a:p>
           <a:p>
             <a:pPr lvl="2"/>
@@ -280,6 +276,7 @@
               <a:rPr lang="en-US"/>
               <a:t>Third level</a:t>
             </a:r>
+            <a:endParaRPr lang="en-US"/>
           </a:p>
           <a:p>
             <a:pPr lvl="3"/>
@@ -287,6 +284,7 @@
               <a:rPr lang="en-US"/>
               <a:t>Fourth level</a:t>
             </a:r>
+            <a:endParaRPr lang="en-US"/>
           </a:p>
           <a:p>
             <a:pPr lvl="4"/>
@@ -358,18 +356,12 @@
           <a:p>
             <a:fld id="{AAEF29E0-F4C6-4F9E-A0FC-A47F296741D9}" type="slidenum">
               <a:rPr lang="en-IN" smtClean="0"/>
-              <a:t>‹#›</a:t>
             </a:fld>
             <a:endParaRPr lang="en-IN"/>
           </a:p>
         </p:txBody>
       </p:sp>
     </p:spTree>
-    <p:extLst>
-      <p:ext uri="{BB962C8B-B14F-4D97-AF65-F5344CB8AC3E}">
-        <p14:creationId xmlns:p14="http://schemas.microsoft.com/office/powerpoint/2010/main" val="257130154"/>
-      </p:ext>
-    </p:extLst>
   </p:cSld>
   <p:clrMap bg1="lt1" tx1="dk1" bg2="lt2" tx2="dk2" accent1="accent1" accent2="accent2" accent3="accent3" accent4="accent4" accent5="accent5" accent6="accent6" hlink="hlink" folHlink="folHlink"/>
   <p:notesStyle>
@@ -467,6 +459,94 @@
 </p:notesMaster>
 </file>
 
+<file path=ppt/notesSlides/notesSlide1.xml><?xml version="1.0" encoding="utf-8"?>
+<p:notes xmlns:a="http://schemas.openxmlformats.org/drawingml/2006/main" xmlns:r="http://schemas.openxmlformats.org/officeDocument/2006/relationships" xmlns:p="http://schemas.openxmlformats.org/presentationml/2006/main">
+  <p:cSld>
+    <p:spTree>
+      <p:nvGrpSpPr>
+        <p:cNvPr id="1" name=""/>
+        <p:cNvGrpSpPr/>
+        <p:nvPr/>
+      </p:nvGrpSpPr>
+      <p:grpSpPr/>
+      <p:sp>
+        <p:nvSpPr>
+          <p:cNvPr id="2" name="Slide Image Placeholder 1"/>
+          <p:cNvSpPr/>
+          <p:nvPr>
+            <p:ph type="sldImg" idx="2"/>
+          </p:nvPr>
+        </p:nvSpPr>
+        <p:spPr/>
+      </p:sp>
+      <p:sp>
+        <p:nvSpPr>
+          <p:cNvPr id="3" name="Text Placeholder 2"/>
+          <p:cNvSpPr/>
+          <p:nvPr>
+            <p:ph type="body" idx="3"/>
+          </p:nvPr>
+        </p:nvSpPr>
+        <p:spPr/>
+        <p:txBody>
+          <a:bodyPr/>
+          <a:p>
+            <a:endParaRPr lang="en-US"/>
+          </a:p>
+        </p:txBody>
+      </p:sp>
+    </p:spTree>
+  </p:cSld>
+  <p:clrMapOvr>
+    <a:masterClrMapping/>
+  </p:clrMapOvr>
+</p:notes>
+</file>
+
+<file path=ppt/notesSlides/notesSlide2.xml><?xml version="1.0" encoding="utf-8"?>
+<p:notes xmlns:a="http://schemas.openxmlformats.org/drawingml/2006/main" xmlns:r="http://schemas.openxmlformats.org/officeDocument/2006/relationships" xmlns:p="http://schemas.openxmlformats.org/presentationml/2006/main">
+  <p:cSld>
+    <p:spTree>
+      <p:nvGrpSpPr>
+        <p:cNvPr id="1" name=""/>
+        <p:cNvGrpSpPr/>
+        <p:nvPr/>
+      </p:nvGrpSpPr>
+      <p:grpSpPr/>
+      <p:sp>
+        <p:nvSpPr>
+          <p:cNvPr id="2" name="Slide Image Placeholder 1"/>
+          <p:cNvSpPr/>
+          <p:nvPr>
+            <p:ph type="sldImg" idx="2"/>
+          </p:nvPr>
+        </p:nvSpPr>
+        <p:spPr/>
+      </p:sp>
+      <p:sp>
+        <p:nvSpPr>
+          <p:cNvPr id="3" name="Text Placeholder 2"/>
+          <p:cNvSpPr/>
+          <p:nvPr>
+            <p:ph type="body" idx="3"/>
+          </p:nvPr>
+        </p:nvSpPr>
+        <p:spPr/>
+        <p:txBody>
+          <a:bodyPr/>
+          <a:p>
+            <a:endParaRPr lang="en-US"/>
+          </a:p>
+        </p:txBody>
+      </p:sp>
+    </p:spTree>
+  </p:cSld>
+  <p:clrMapOvr>
+    <a:masterClrMapping/>
+  </p:clrMapOvr>
+</p:notes>
+</file>
+
 <file path=ppt/slideLayouts/slideLayout1.xml><?xml version="1.0" encoding="utf-8"?>
 <p:sldLayout xmlns:a="http://schemas.openxmlformats.org/drawingml/2006/main" xmlns:r="http://schemas.openxmlformats.org/officeDocument/2006/relationships" xmlns:p="http://schemas.openxmlformats.org/presentationml/2006/main" type="title" preserve="1">
   <p:cSld name="Title Slide">
@@ -486,13 +566,7 @@
       </p:grpSpPr>
       <p:sp>
         <p:nvSpPr>
-          <p:cNvPr id="2" name="Title 1">
-            <a:extLst>
-              <a:ext uri="{FF2B5EF4-FFF2-40B4-BE49-F238E27FC236}">
-                <a16:creationId xmlns:a16="http://schemas.microsoft.com/office/drawing/2014/main" id="{48A2AA3C-1DA6-4AC7-B889-5A61B98CF8BB}"/>
-              </a:ext>
-            </a:extLst>
-          </p:cNvPr>
+          <p:cNvPr id="2" name="Title 1"/>
           <p:cNvSpPr>
             <a:spLocks noGrp="1"/>
           </p:cNvSpPr>
@@ -524,13 +598,7 @@
       </p:sp>
       <p:sp>
         <p:nvSpPr>
-          <p:cNvPr id="3" name="Subtitle 2">
-            <a:extLst>
-              <a:ext uri="{FF2B5EF4-FFF2-40B4-BE49-F238E27FC236}">
-                <a16:creationId xmlns:a16="http://schemas.microsoft.com/office/drawing/2014/main" id="{CB5211EC-018E-4AFB-BDF7-12482E4BD586}"/>
-              </a:ext>
-            </a:extLst>
-          </p:cNvPr>
+          <p:cNvPr id="3" name="Subtitle 2"/>
           <p:cNvSpPr>
             <a:spLocks noGrp="1"/>
           </p:cNvSpPr>
@@ -595,13 +663,7 @@
       </p:sp>
       <p:sp>
         <p:nvSpPr>
-          <p:cNvPr id="4" name="Date Placeholder 3">
-            <a:extLst>
-              <a:ext uri="{FF2B5EF4-FFF2-40B4-BE49-F238E27FC236}">
-                <a16:creationId xmlns:a16="http://schemas.microsoft.com/office/drawing/2014/main" id="{8FC14258-E7F4-45E1-B9F3-59A99792B6BB}"/>
-              </a:ext>
-            </a:extLst>
-          </p:cNvPr>
+          <p:cNvPr id="4" name="Date Placeholder 3"/>
           <p:cNvSpPr>
             <a:spLocks noGrp="1"/>
           </p:cNvSpPr>
@@ -616,7 +678,6 @@
           <a:p>
             <a:fld id="{9D7F0AD8-5C66-43D8-AC43-24C5798B5018}" type="datetimeFigureOut">
               <a:rPr lang="en-IN" smtClean="0"/>
-              <a:t>25-01-2020</a:t>
             </a:fld>
             <a:endParaRPr lang="en-IN"/>
           </a:p>
@@ -624,13 +685,7 @@
       </p:sp>
       <p:sp>
         <p:nvSpPr>
-          <p:cNvPr id="5" name="Footer Placeholder 4">
-            <a:extLst>
-              <a:ext uri="{FF2B5EF4-FFF2-40B4-BE49-F238E27FC236}">
-                <a16:creationId xmlns:a16="http://schemas.microsoft.com/office/drawing/2014/main" id="{4DA8988E-BB44-4166-9DAA-366A2A2947A8}"/>
-              </a:ext>
-            </a:extLst>
-          </p:cNvPr>
+          <p:cNvPr id="5" name="Footer Placeholder 4"/>
           <p:cNvSpPr>
             <a:spLocks noGrp="1"/>
           </p:cNvSpPr>
@@ -649,13 +704,7 @@
       </p:sp>
       <p:sp>
         <p:nvSpPr>
-          <p:cNvPr id="6" name="Slide Number Placeholder 5">
-            <a:extLst>
-              <a:ext uri="{FF2B5EF4-FFF2-40B4-BE49-F238E27FC236}">
-                <a16:creationId xmlns:a16="http://schemas.microsoft.com/office/drawing/2014/main" id="{ACB328CA-8C37-45EC-BB56-7FED62292C05}"/>
-              </a:ext>
-            </a:extLst>
-          </p:cNvPr>
+          <p:cNvPr id="6" name="Slide Number Placeholder 5"/>
           <p:cNvSpPr>
             <a:spLocks noGrp="1"/>
           </p:cNvSpPr>
@@ -670,18 +719,12 @@
           <a:p>
             <a:fld id="{272DB34D-9B08-450E-9C20-58190B62727D}" type="slidenum">
               <a:rPr lang="en-IN" smtClean="0"/>
-              <a:t>‹#›</a:t>
             </a:fld>
             <a:endParaRPr lang="en-IN"/>
           </a:p>
         </p:txBody>
       </p:sp>
     </p:spTree>
-    <p:extLst>
-      <p:ext uri="{BB962C8B-B14F-4D97-AF65-F5344CB8AC3E}">
-        <p14:creationId xmlns:p14="http://schemas.microsoft.com/office/powerpoint/2010/main" val="1676523228"/>
-      </p:ext>
-    </p:extLst>
   </p:cSld>
   <p:clrMapOvr>
     <a:masterClrMapping/>
@@ -708,13 +751,7 @@
       </p:grpSpPr>
       <p:sp>
         <p:nvSpPr>
-          <p:cNvPr id="2" name="Title 1">
-            <a:extLst>
-              <a:ext uri="{FF2B5EF4-FFF2-40B4-BE49-F238E27FC236}">
-                <a16:creationId xmlns:a16="http://schemas.microsoft.com/office/drawing/2014/main" id="{B2068281-FF3E-4218-957C-5FB1B20A4FE8}"/>
-              </a:ext>
-            </a:extLst>
-          </p:cNvPr>
+          <p:cNvPr id="2" name="Title 1"/>
           <p:cNvSpPr>
             <a:spLocks noGrp="1"/>
           </p:cNvSpPr>
@@ -737,13 +774,7 @@
       </p:sp>
       <p:sp>
         <p:nvSpPr>
-          <p:cNvPr id="3" name="Vertical Text Placeholder 2">
-            <a:extLst>
-              <a:ext uri="{FF2B5EF4-FFF2-40B4-BE49-F238E27FC236}">
-                <a16:creationId xmlns:a16="http://schemas.microsoft.com/office/drawing/2014/main" id="{31D827C6-A6B2-49EA-89C4-677D7638BB86}"/>
-              </a:ext>
-            </a:extLst>
-          </p:cNvPr>
+          <p:cNvPr id="3" name="Vertical Text Placeholder 2"/>
           <p:cNvSpPr>
             <a:spLocks noGrp="1"/>
           </p:cNvSpPr>
@@ -761,6 +792,7 @@
               <a:rPr lang="en-US"/>
               <a:t>Click to edit Master text styles</a:t>
             </a:r>
+            <a:endParaRPr lang="en-US"/>
           </a:p>
           <a:p>
             <a:pPr lvl="1"/>
@@ -768,6 +800,7 @@
               <a:rPr lang="en-US"/>
               <a:t>Second level</a:t>
             </a:r>
+            <a:endParaRPr lang="en-US"/>
           </a:p>
           <a:p>
             <a:pPr lvl="2"/>
@@ -775,6 +808,7 @@
               <a:rPr lang="en-US"/>
               <a:t>Third level</a:t>
             </a:r>
+            <a:endParaRPr lang="en-US"/>
           </a:p>
           <a:p>
             <a:pPr lvl="3"/>
@@ -782,6 +816,7 @@
               <a:rPr lang="en-US"/>
               <a:t>Fourth level</a:t>
             </a:r>
+            <a:endParaRPr lang="en-US"/>
           </a:p>
           <a:p>
             <a:pPr lvl="4"/>
@@ -795,13 +830,7 @@
       </p:sp>
       <p:sp>
         <p:nvSpPr>
-          <p:cNvPr id="4" name="Date Placeholder 3">
-            <a:extLst>
-              <a:ext uri="{FF2B5EF4-FFF2-40B4-BE49-F238E27FC236}">
-                <a16:creationId xmlns:a16="http://schemas.microsoft.com/office/drawing/2014/main" id="{705B0A4A-85C9-49E8-9219-DA698502371C}"/>
-              </a:ext>
-            </a:extLst>
-          </p:cNvPr>
+          <p:cNvPr id="4" name="Date Placeholder 3"/>
           <p:cNvSpPr>
             <a:spLocks noGrp="1"/>
           </p:cNvSpPr>
@@ -816,7 +845,6 @@
           <a:p>
             <a:fld id="{9D7F0AD8-5C66-43D8-AC43-24C5798B5018}" type="datetimeFigureOut">
               <a:rPr lang="en-IN" smtClean="0"/>
-              <a:t>25-01-2020</a:t>
             </a:fld>
             <a:endParaRPr lang="en-IN"/>
           </a:p>
@@ -824,13 +852,7 @@
       </p:sp>
       <p:sp>
         <p:nvSpPr>
-          <p:cNvPr id="5" name="Footer Placeholder 4">
-            <a:extLst>
-              <a:ext uri="{FF2B5EF4-FFF2-40B4-BE49-F238E27FC236}">
-                <a16:creationId xmlns:a16="http://schemas.microsoft.com/office/drawing/2014/main" id="{8B1558B4-699D-4BB6-B217-FD0085B8CC8C}"/>
-              </a:ext>
-            </a:extLst>
-          </p:cNvPr>
+          <p:cNvPr id="5" name="Footer Placeholder 4"/>
           <p:cNvSpPr>
             <a:spLocks noGrp="1"/>
           </p:cNvSpPr>
@@ -849,13 +871,7 @@
       </p:sp>
       <p:sp>
         <p:nvSpPr>
-          <p:cNvPr id="6" name="Slide Number Placeholder 5">
-            <a:extLst>
-              <a:ext uri="{FF2B5EF4-FFF2-40B4-BE49-F238E27FC236}">
-                <a16:creationId xmlns:a16="http://schemas.microsoft.com/office/drawing/2014/main" id="{0D7913AF-CC2B-4105-B155-5BEAE61A481C}"/>
-              </a:ext>
-            </a:extLst>
-          </p:cNvPr>
+          <p:cNvPr id="6" name="Slide Number Placeholder 5"/>
           <p:cNvSpPr>
             <a:spLocks noGrp="1"/>
           </p:cNvSpPr>
@@ -870,18 +886,12 @@
           <a:p>
             <a:fld id="{272DB34D-9B08-450E-9C20-58190B62727D}" type="slidenum">
               <a:rPr lang="en-IN" smtClean="0"/>
-              <a:t>‹#›</a:t>
             </a:fld>
             <a:endParaRPr lang="en-IN"/>
           </a:p>
         </p:txBody>
       </p:sp>
     </p:spTree>
-    <p:extLst>
-      <p:ext uri="{BB962C8B-B14F-4D97-AF65-F5344CB8AC3E}">
-        <p14:creationId xmlns:p14="http://schemas.microsoft.com/office/powerpoint/2010/main" val="155275502"/>
-      </p:ext>
-    </p:extLst>
   </p:cSld>
   <p:clrMapOvr>
     <a:masterClrMapping/>
@@ -908,13 +918,7 @@
       </p:grpSpPr>
       <p:sp>
         <p:nvSpPr>
-          <p:cNvPr id="2" name="Vertical Title 1">
-            <a:extLst>
-              <a:ext uri="{FF2B5EF4-FFF2-40B4-BE49-F238E27FC236}">
-                <a16:creationId xmlns:a16="http://schemas.microsoft.com/office/drawing/2014/main" id="{685295D7-F57F-45D2-9CC4-FA05639FF2B7}"/>
-              </a:ext>
-            </a:extLst>
-          </p:cNvPr>
+          <p:cNvPr id="2" name="Vertical Title 1"/>
           <p:cNvSpPr>
             <a:spLocks noGrp="1"/>
           </p:cNvSpPr>
@@ -942,13 +946,7 @@
       </p:sp>
       <p:sp>
         <p:nvSpPr>
-          <p:cNvPr id="3" name="Vertical Text Placeholder 2">
-            <a:extLst>
-              <a:ext uri="{FF2B5EF4-FFF2-40B4-BE49-F238E27FC236}">
-                <a16:creationId xmlns:a16="http://schemas.microsoft.com/office/drawing/2014/main" id="{81D60A76-8363-4698-83DA-E5F523FC1497}"/>
-              </a:ext>
-            </a:extLst>
-          </p:cNvPr>
+          <p:cNvPr id="3" name="Vertical Text Placeholder 2"/>
           <p:cNvSpPr>
             <a:spLocks noGrp="1"/>
           </p:cNvSpPr>
@@ -971,6 +969,7 @@
               <a:rPr lang="en-US"/>
               <a:t>Click to edit Master text styles</a:t>
             </a:r>
+            <a:endParaRPr lang="en-US"/>
           </a:p>
           <a:p>
             <a:pPr lvl="1"/>
@@ -978,6 +977,7 @@
               <a:rPr lang="en-US"/>
               <a:t>Second level</a:t>
             </a:r>
+            <a:endParaRPr lang="en-US"/>
           </a:p>
           <a:p>
             <a:pPr lvl="2"/>
@@ -985,6 +985,7 @@
               <a:rPr lang="en-US"/>
               <a:t>Third level</a:t>
             </a:r>
+            <a:endParaRPr lang="en-US"/>
           </a:p>
           <a:p>
             <a:pPr lvl="3"/>
@@ -992,6 +993,7 @@
               <a:rPr lang="en-US"/>
               <a:t>Fourth level</a:t>
             </a:r>
+            <a:endParaRPr lang="en-US"/>
           </a:p>
           <a:p>
             <a:pPr lvl="4"/>
@@ -1005,13 +1007,7 @@
       </p:sp>
       <p:sp>
         <p:nvSpPr>
-          <p:cNvPr id="4" name="Date Placeholder 3">
-            <a:extLst>
-              <a:ext uri="{FF2B5EF4-FFF2-40B4-BE49-F238E27FC236}">
-                <a16:creationId xmlns:a16="http://schemas.microsoft.com/office/drawing/2014/main" id="{C0B8AE89-F4F3-4483-89E8-B2E2E20D4A44}"/>
-              </a:ext>
-            </a:extLst>
-          </p:cNvPr>
+          <p:cNvPr id="4" name="Date Placeholder 3"/>
           <p:cNvSpPr>
             <a:spLocks noGrp="1"/>
           </p:cNvSpPr>
@@ -1026,7 +1022,6 @@
           <a:p>
             <a:fld id="{9D7F0AD8-5C66-43D8-AC43-24C5798B5018}" type="datetimeFigureOut">
               <a:rPr lang="en-IN" smtClean="0"/>
-              <a:t>25-01-2020</a:t>
             </a:fld>
             <a:endParaRPr lang="en-IN"/>
           </a:p>
@@ -1034,13 +1029,7 @@
       </p:sp>
       <p:sp>
         <p:nvSpPr>
-          <p:cNvPr id="5" name="Footer Placeholder 4">
-            <a:extLst>
-              <a:ext uri="{FF2B5EF4-FFF2-40B4-BE49-F238E27FC236}">
-                <a16:creationId xmlns:a16="http://schemas.microsoft.com/office/drawing/2014/main" id="{97A77B1F-2CEF-4F89-B13C-C8A4963D2717}"/>
-              </a:ext>
-            </a:extLst>
-          </p:cNvPr>
+          <p:cNvPr id="5" name="Footer Placeholder 4"/>
           <p:cNvSpPr>
             <a:spLocks noGrp="1"/>
           </p:cNvSpPr>
@@ -1059,13 +1048,7 @@
       </p:sp>
       <p:sp>
         <p:nvSpPr>
-          <p:cNvPr id="6" name="Slide Number Placeholder 5">
-            <a:extLst>
-              <a:ext uri="{FF2B5EF4-FFF2-40B4-BE49-F238E27FC236}">
-                <a16:creationId xmlns:a16="http://schemas.microsoft.com/office/drawing/2014/main" id="{B18E6FD2-8C3C-4E7A-A0E1-1CCB429E1C9D}"/>
-              </a:ext>
-            </a:extLst>
-          </p:cNvPr>
+          <p:cNvPr id="6" name="Slide Number Placeholder 5"/>
           <p:cNvSpPr>
             <a:spLocks noGrp="1"/>
           </p:cNvSpPr>
@@ -1080,18 +1063,12 @@
           <a:p>
             <a:fld id="{272DB34D-9B08-450E-9C20-58190B62727D}" type="slidenum">
               <a:rPr lang="en-IN" smtClean="0"/>
-              <a:t>‹#›</a:t>
             </a:fld>
             <a:endParaRPr lang="en-IN"/>
           </a:p>
         </p:txBody>
       </p:sp>
     </p:spTree>
-    <p:extLst>
-      <p:ext uri="{BB962C8B-B14F-4D97-AF65-F5344CB8AC3E}">
-        <p14:creationId xmlns:p14="http://schemas.microsoft.com/office/powerpoint/2010/main" val="3086870437"/>
-      </p:ext>
-    </p:extLst>
   </p:cSld>
   <p:clrMapOvr>
     <a:masterClrMapping/>
@@ -1118,13 +1095,7 @@
       </p:grpSpPr>
       <p:sp>
         <p:nvSpPr>
-          <p:cNvPr id="2" name="Title 1">
-            <a:extLst>
-              <a:ext uri="{FF2B5EF4-FFF2-40B4-BE49-F238E27FC236}">
-                <a16:creationId xmlns:a16="http://schemas.microsoft.com/office/drawing/2014/main" id="{6E0E8839-E475-4D24-A2EB-64373380F1F3}"/>
-              </a:ext>
-            </a:extLst>
-          </p:cNvPr>
+          <p:cNvPr id="2" name="Title 1"/>
           <p:cNvSpPr>
             <a:spLocks noGrp="1"/>
           </p:cNvSpPr>
@@ -1147,13 +1118,7 @@
       </p:sp>
       <p:sp>
         <p:nvSpPr>
-          <p:cNvPr id="3" name="Content Placeholder 2">
-            <a:extLst>
-              <a:ext uri="{FF2B5EF4-FFF2-40B4-BE49-F238E27FC236}">
-                <a16:creationId xmlns:a16="http://schemas.microsoft.com/office/drawing/2014/main" id="{792363EA-723E-454C-86CF-8EFE6C073847}"/>
-              </a:ext>
-            </a:extLst>
-          </p:cNvPr>
+          <p:cNvPr id="3" name="Content Placeholder 2"/>
           <p:cNvSpPr>
             <a:spLocks noGrp="1"/>
           </p:cNvSpPr>
@@ -1171,6 +1136,7 @@
               <a:rPr lang="en-US"/>
               <a:t>Click to edit Master text styles</a:t>
             </a:r>
+            <a:endParaRPr lang="en-US"/>
           </a:p>
           <a:p>
             <a:pPr lvl="1"/>
@@ -1178,6 +1144,7 @@
               <a:rPr lang="en-US"/>
               <a:t>Second level</a:t>
             </a:r>
+            <a:endParaRPr lang="en-US"/>
           </a:p>
           <a:p>
             <a:pPr lvl="2"/>
@@ -1185,6 +1152,7 @@
               <a:rPr lang="en-US"/>
               <a:t>Third level</a:t>
             </a:r>
+            <a:endParaRPr lang="en-US"/>
           </a:p>
           <a:p>
             <a:pPr lvl="3"/>
@@ -1192,6 +1160,7 @@
               <a:rPr lang="en-US"/>
               <a:t>Fourth level</a:t>
             </a:r>
+            <a:endParaRPr lang="en-US"/>
           </a:p>
           <a:p>
             <a:pPr lvl="4"/>
@@ -1205,13 +1174,7 @@
       </p:sp>
       <p:sp>
         <p:nvSpPr>
-          <p:cNvPr id="4" name="Date Placeholder 3">
-            <a:extLst>
-              <a:ext uri="{FF2B5EF4-FFF2-40B4-BE49-F238E27FC236}">
-                <a16:creationId xmlns:a16="http://schemas.microsoft.com/office/drawing/2014/main" id="{6B1F77F9-0480-4D69-A8FF-649D2EF142B3}"/>
-              </a:ext>
-            </a:extLst>
-          </p:cNvPr>
+          <p:cNvPr id="4" name="Date Placeholder 3"/>
           <p:cNvSpPr>
             <a:spLocks noGrp="1"/>
           </p:cNvSpPr>
@@ -1226,7 +1189,6 @@
           <a:p>
             <a:fld id="{9D7F0AD8-5C66-43D8-AC43-24C5798B5018}" type="datetimeFigureOut">
               <a:rPr lang="en-IN" smtClean="0"/>
-              <a:t>25-01-2020</a:t>
             </a:fld>
             <a:endParaRPr lang="en-IN"/>
           </a:p>
@@ -1234,13 +1196,7 @@
       </p:sp>
       <p:sp>
         <p:nvSpPr>
-          <p:cNvPr id="5" name="Footer Placeholder 4">
-            <a:extLst>
-              <a:ext uri="{FF2B5EF4-FFF2-40B4-BE49-F238E27FC236}">
-                <a16:creationId xmlns:a16="http://schemas.microsoft.com/office/drawing/2014/main" id="{3ECAB670-C745-4492-AD4C-59796AF1B4DB}"/>
-              </a:ext>
-            </a:extLst>
-          </p:cNvPr>
+          <p:cNvPr id="5" name="Footer Placeholder 4"/>
           <p:cNvSpPr>
             <a:spLocks noGrp="1"/>
           </p:cNvSpPr>
@@ -1259,13 +1215,7 @@
       </p:sp>
       <p:sp>
         <p:nvSpPr>
-          <p:cNvPr id="6" name="Slide Number Placeholder 5">
-            <a:extLst>
-              <a:ext uri="{FF2B5EF4-FFF2-40B4-BE49-F238E27FC236}">
-                <a16:creationId xmlns:a16="http://schemas.microsoft.com/office/drawing/2014/main" id="{F1A14F44-44CA-47F8-B78B-0AEACD415856}"/>
-              </a:ext>
-            </a:extLst>
-          </p:cNvPr>
+          <p:cNvPr id="6" name="Slide Number Placeholder 5"/>
           <p:cNvSpPr>
             <a:spLocks noGrp="1"/>
           </p:cNvSpPr>
@@ -1280,18 +1230,12 @@
           <a:p>
             <a:fld id="{272DB34D-9B08-450E-9C20-58190B62727D}" type="slidenum">
               <a:rPr lang="en-IN" smtClean="0"/>
-              <a:t>‹#›</a:t>
             </a:fld>
             <a:endParaRPr lang="en-IN"/>
           </a:p>
         </p:txBody>
       </p:sp>
     </p:spTree>
-    <p:extLst>
-      <p:ext uri="{BB962C8B-B14F-4D97-AF65-F5344CB8AC3E}">
-        <p14:creationId xmlns:p14="http://schemas.microsoft.com/office/powerpoint/2010/main" val="4288464397"/>
-      </p:ext>
-    </p:extLst>
   </p:cSld>
   <p:clrMapOvr>
     <a:masterClrMapping/>
@@ -1318,13 +1262,7 @@
       </p:grpSpPr>
       <p:sp>
         <p:nvSpPr>
-          <p:cNvPr id="2" name="Title 1">
-            <a:extLst>
-              <a:ext uri="{FF2B5EF4-FFF2-40B4-BE49-F238E27FC236}">
-                <a16:creationId xmlns:a16="http://schemas.microsoft.com/office/drawing/2014/main" id="{98836055-7F2F-497E-9C67-79D214AA91B6}"/>
-              </a:ext>
-            </a:extLst>
-          </p:cNvPr>
+          <p:cNvPr id="2" name="Title 1"/>
           <p:cNvSpPr>
             <a:spLocks noGrp="1"/>
           </p:cNvSpPr>
@@ -1356,13 +1294,7 @@
       </p:sp>
       <p:sp>
         <p:nvSpPr>
-          <p:cNvPr id="3" name="Text Placeholder 2">
-            <a:extLst>
-              <a:ext uri="{FF2B5EF4-FFF2-40B4-BE49-F238E27FC236}">
-                <a16:creationId xmlns:a16="http://schemas.microsoft.com/office/drawing/2014/main" id="{32D790DB-7585-4418-B0A6-AE478870D75E}"/>
-              </a:ext>
-            </a:extLst>
-          </p:cNvPr>
+          <p:cNvPr id="3" name="Text Placeholder 2"/>
           <p:cNvSpPr>
             <a:spLocks noGrp="1"/>
           </p:cNvSpPr>
@@ -1476,18 +1408,13 @@
               <a:rPr lang="en-US"/>
               <a:t>Click to edit Master text styles</a:t>
             </a:r>
-          </a:p>
-        </p:txBody>
-      </p:sp>
-      <p:sp>
-        <p:nvSpPr>
-          <p:cNvPr id="4" name="Date Placeholder 3">
-            <a:extLst>
-              <a:ext uri="{FF2B5EF4-FFF2-40B4-BE49-F238E27FC236}">
-                <a16:creationId xmlns:a16="http://schemas.microsoft.com/office/drawing/2014/main" id="{E8604B59-DDBE-478B-889C-383BED28B8CF}"/>
-              </a:ext>
-            </a:extLst>
-          </p:cNvPr>
+            <a:endParaRPr lang="en-US"/>
+          </a:p>
+        </p:txBody>
+      </p:sp>
+      <p:sp>
+        <p:nvSpPr>
+          <p:cNvPr id="4" name="Date Placeholder 3"/>
           <p:cNvSpPr>
             <a:spLocks noGrp="1"/>
           </p:cNvSpPr>
@@ -1502,7 +1429,6 @@
           <a:p>
             <a:fld id="{9D7F0AD8-5C66-43D8-AC43-24C5798B5018}" type="datetimeFigureOut">
               <a:rPr lang="en-IN" smtClean="0"/>
-              <a:t>25-01-2020</a:t>
             </a:fld>
             <a:endParaRPr lang="en-IN"/>
           </a:p>
@@ -1510,13 +1436,7 @@
       </p:sp>
       <p:sp>
         <p:nvSpPr>
-          <p:cNvPr id="5" name="Footer Placeholder 4">
-            <a:extLst>
-              <a:ext uri="{FF2B5EF4-FFF2-40B4-BE49-F238E27FC236}">
-                <a16:creationId xmlns:a16="http://schemas.microsoft.com/office/drawing/2014/main" id="{AD3BF924-E52D-454C-99D2-32C291825D06}"/>
-              </a:ext>
-            </a:extLst>
-          </p:cNvPr>
+          <p:cNvPr id="5" name="Footer Placeholder 4"/>
           <p:cNvSpPr>
             <a:spLocks noGrp="1"/>
           </p:cNvSpPr>
@@ -1535,13 +1455,7 @@
       </p:sp>
       <p:sp>
         <p:nvSpPr>
-          <p:cNvPr id="6" name="Slide Number Placeholder 5">
-            <a:extLst>
-              <a:ext uri="{FF2B5EF4-FFF2-40B4-BE49-F238E27FC236}">
-                <a16:creationId xmlns:a16="http://schemas.microsoft.com/office/drawing/2014/main" id="{2EABE195-2816-4C86-B4EF-777E671AA944}"/>
-              </a:ext>
-            </a:extLst>
-          </p:cNvPr>
+          <p:cNvPr id="6" name="Slide Number Placeholder 5"/>
           <p:cNvSpPr>
             <a:spLocks noGrp="1"/>
           </p:cNvSpPr>
@@ -1556,18 +1470,12 @@
           <a:p>
             <a:fld id="{272DB34D-9B08-450E-9C20-58190B62727D}" type="slidenum">
               <a:rPr lang="en-IN" smtClean="0"/>
-              <a:t>‹#›</a:t>
             </a:fld>
             <a:endParaRPr lang="en-IN"/>
           </a:p>
         </p:txBody>
       </p:sp>
     </p:spTree>
-    <p:extLst>
-      <p:ext uri="{BB962C8B-B14F-4D97-AF65-F5344CB8AC3E}">
-        <p14:creationId xmlns:p14="http://schemas.microsoft.com/office/powerpoint/2010/main" val="3663973701"/>
-      </p:ext>
-    </p:extLst>
   </p:cSld>
   <p:clrMapOvr>
     <a:masterClrMapping/>
@@ -1594,13 +1502,7 @@
       </p:grpSpPr>
       <p:sp>
         <p:nvSpPr>
-          <p:cNvPr id="2" name="Title 1">
-            <a:extLst>
-              <a:ext uri="{FF2B5EF4-FFF2-40B4-BE49-F238E27FC236}">
-                <a16:creationId xmlns:a16="http://schemas.microsoft.com/office/drawing/2014/main" id="{F2FB8087-3237-44B9-8669-FAB89FACCC6F}"/>
-              </a:ext>
-            </a:extLst>
-          </p:cNvPr>
+          <p:cNvPr id="2" name="Title 1"/>
           <p:cNvSpPr>
             <a:spLocks noGrp="1"/>
           </p:cNvSpPr>
@@ -1623,13 +1525,7 @@
       </p:sp>
       <p:sp>
         <p:nvSpPr>
-          <p:cNvPr id="3" name="Content Placeholder 2">
-            <a:extLst>
-              <a:ext uri="{FF2B5EF4-FFF2-40B4-BE49-F238E27FC236}">
-                <a16:creationId xmlns:a16="http://schemas.microsoft.com/office/drawing/2014/main" id="{DAA42F1A-BBCC-4298-9B66-6B9FB0143102}"/>
-              </a:ext>
-            </a:extLst>
-          </p:cNvPr>
+          <p:cNvPr id="3" name="Content Placeholder 2"/>
           <p:cNvSpPr>
             <a:spLocks noGrp="1"/>
           </p:cNvSpPr>
@@ -1652,6 +1548,7 @@
               <a:rPr lang="en-US"/>
               <a:t>Click to edit Master text styles</a:t>
             </a:r>
+            <a:endParaRPr lang="en-US"/>
           </a:p>
           <a:p>
             <a:pPr lvl="1"/>
@@ -1659,6 +1556,7 @@
               <a:rPr lang="en-US"/>
               <a:t>Second level</a:t>
             </a:r>
+            <a:endParaRPr lang="en-US"/>
           </a:p>
           <a:p>
             <a:pPr lvl="2"/>
@@ -1666,6 +1564,7 @@
               <a:rPr lang="en-US"/>
               <a:t>Third level</a:t>
             </a:r>
+            <a:endParaRPr lang="en-US"/>
           </a:p>
           <a:p>
             <a:pPr lvl="3"/>
@@ -1673,6 +1572,7 @@
               <a:rPr lang="en-US"/>
               <a:t>Fourth level</a:t>
             </a:r>
+            <a:endParaRPr lang="en-US"/>
           </a:p>
           <a:p>
             <a:pPr lvl="4"/>
@@ -1686,13 +1586,7 @@
       </p:sp>
       <p:sp>
         <p:nvSpPr>
-          <p:cNvPr id="4" name="Content Placeholder 3">
-            <a:extLst>
-              <a:ext uri="{FF2B5EF4-FFF2-40B4-BE49-F238E27FC236}">
-                <a16:creationId xmlns:a16="http://schemas.microsoft.com/office/drawing/2014/main" id="{3B7C8D85-AA33-4A9D-BED4-F5AAB7DDA44C}"/>
-              </a:ext>
-            </a:extLst>
-          </p:cNvPr>
+          <p:cNvPr id="4" name="Content Placeholder 3"/>
           <p:cNvSpPr>
             <a:spLocks noGrp="1"/>
           </p:cNvSpPr>
@@ -1715,6 +1609,7 @@
               <a:rPr lang="en-US"/>
               <a:t>Click to edit Master text styles</a:t>
             </a:r>
+            <a:endParaRPr lang="en-US"/>
           </a:p>
           <a:p>
             <a:pPr lvl="1"/>
@@ -1722,6 +1617,7 @@
               <a:rPr lang="en-US"/>
               <a:t>Second level</a:t>
             </a:r>
+            <a:endParaRPr lang="en-US"/>
           </a:p>
           <a:p>
             <a:pPr lvl="2"/>
@@ -1729,6 +1625,7 @@
               <a:rPr lang="en-US"/>
               <a:t>Third level</a:t>
             </a:r>
+            <a:endParaRPr lang="en-US"/>
           </a:p>
           <a:p>
             <a:pPr lvl="3"/>
@@ -1736,6 +1633,7 @@
               <a:rPr lang="en-US"/>
               <a:t>Fourth level</a:t>
             </a:r>
+            <a:endParaRPr lang="en-US"/>
           </a:p>
           <a:p>
             <a:pPr lvl="4"/>
@@ -1749,13 +1647,7 @@
       </p:sp>
       <p:sp>
         <p:nvSpPr>
-          <p:cNvPr id="5" name="Date Placeholder 4">
-            <a:extLst>
-              <a:ext uri="{FF2B5EF4-FFF2-40B4-BE49-F238E27FC236}">
-                <a16:creationId xmlns:a16="http://schemas.microsoft.com/office/drawing/2014/main" id="{4EA42804-D245-49B9-9642-9C056FC4EDD3}"/>
-              </a:ext>
-            </a:extLst>
-          </p:cNvPr>
+          <p:cNvPr id="5" name="Date Placeholder 4"/>
           <p:cNvSpPr>
             <a:spLocks noGrp="1"/>
           </p:cNvSpPr>
@@ -1770,7 +1662,6 @@
           <a:p>
             <a:fld id="{9D7F0AD8-5C66-43D8-AC43-24C5798B5018}" type="datetimeFigureOut">
               <a:rPr lang="en-IN" smtClean="0"/>
-              <a:t>25-01-2020</a:t>
             </a:fld>
             <a:endParaRPr lang="en-IN"/>
           </a:p>
@@ -1778,13 +1669,7 @@
       </p:sp>
       <p:sp>
         <p:nvSpPr>
-          <p:cNvPr id="6" name="Footer Placeholder 5">
-            <a:extLst>
-              <a:ext uri="{FF2B5EF4-FFF2-40B4-BE49-F238E27FC236}">
-                <a16:creationId xmlns:a16="http://schemas.microsoft.com/office/drawing/2014/main" id="{F748A5A3-BC9C-49DE-B5D2-AA4BF711083E}"/>
-              </a:ext>
-            </a:extLst>
-          </p:cNvPr>
+          <p:cNvPr id="6" name="Footer Placeholder 5"/>
           <p:cNvSpPr>
             <a:spLocks noGrp="1"/>
           </p:cNvSpPr>
@@ -1803,13 +1688,7 @@
       </p:sp>
       <p:sp>
         <p:nvSpPr>
-          <p:cNvPr id="7" name="Slide Number Placeholder 6">
-            <a:extLst>
-              <a:ext uri="{FF2B5EF4-FFF2-40B4-BE49-F238E27FC236}">
-                <a16:creationId xmlns:a16="http://schemas.microsoft.com/office/drawing/2014/main" id="{66F15A7E-3521-4D90-A98D-9F01ACA25291}"/>
-              </a:ext>
-            </a:extLst>
-          </p:cNvPr>
+          <p:cNvPr id="7" name="Slide Number Placeholder 6"/>
           <p:cNvSpPr>
             <a:spLocks noGrp="1"/>
           </p:cNvSpPr>
@@ -1824,18 +1703,12 @@
           <a:p>
             <a:fld id="{272DB34D-9B08-450E-9C20-58190B62727D}" type="slidenum">
               <a:rPr lang="en-IN" smtClean="0"/>
-              <a:t>‹#›</a:t>
             </a:fld>
             <a:endParaRPr lang="en-IN"/>
           </a:p>
         </p:txBody>
       </p:sp>
     </p:spTree>
-    <p:extLst>
-      <p:ext uri="{BB962C8B-B14F-4D97-AF65-F5344CB8AC3E}">
-        <p14:creationId xmlns:p14="http://schemas.microsoft.com/office/powerpoint/2010/main" val="2622847394"/>
-      </p:ext>
-    </p:extLst>
   </p:cSld>
   <p:clrMapOvr>
     <a:masterClrMapping/>
@@ -1862,13 +1735,7 @@
       </p:grpSpPr>
       <p:sp>
         <p:nvSpPr>
-          <p:cNvPr id="2" name="Title 1">
-            <a:extLst>
-              <a:ext uri="{FF2B5EF4-FFF2-40B4-BE49-F238E27FC236}">
-                <a16:creationId xmlns:a16="http://schemas.microsoft.com/office/drawing/2014/main" id="{B9D7A1C7-DAB3-41CD-B104-5C265DA9975D}"/>
-              </a:ext>
-            </a:extLst>
-          </p:cNvPr>
+          <p:cNvPr id="2" name="Title 1"/>
           <p:cNvSpPr>
             <a:spLocks noGrp="1"/>
           </p:cNvSpPr>
@@ -1896,13 +1763,7 @@
       </p:sp>
       <p:sp>
         <p:nvSpPr>
-          <p:cNvPr id="3" name="Text Placeholder 2">
-            <a:extLst>
-              <a:ext uri="{FF2B5EF4-FFF2-40B4-BE49-F238E27FC236}">
-                <a16:creationId xmlns:a16="http://schemas.microsoft.com/office/drawing/2014/main" id="{3AADDDC9-4F1F-44B0-AEBD-B2BB035FF5BB}"/>
-              </a:ext>
-            </a:extLst>
-          </p:cNvPr>
+          <p:cNvPr id="3" name="Text Placeholder 2"/>
           <p:cNvSpPr>
             <a:spLocks noGrp="1"/>
           </p:cNvSpPr>
@@ -1962,18 +1823,13 @@
               <a:rPr lang="en-US"/>
               <a:t>Click to edit Master text styles</a:t>
             </a:r>
-          </a:p>
-        </p:txBody>
-      </p:sp>
-      <p:sp>
-        <p:nvSpPr>
-          <p:cNvPr id="4" name="Content Placeholder 3">
-            <a:extLst>
-              <a:ext uri="{FF2B5EF4-FFF2-40B4-BE49-F238E27FC236}">
-                <a16:creationId xmlns:a16="http://schemas.microsoft.com/office/drawing/2014/main" id="{E702CC48-09BB-4543-A222-3636EFD02794}"/>
-              </a:ext>
-            </a:extLst>
-          </p:cNvPr>
+            <a:endParaRPr lang="en-US"/>
+          </a:p>
+        </p:txBody>
+      </p:sp>
+      <p:sp>
+        <p:nvSpPr>
+          <p:cNvPr id="4" name="Content Placeholder 3"/>
           <p:cNvSpPr>
             <a:spLocks noGrp="1"/>
           </p:cNvSpPr>
@@ -1996,6 +1852,7 @@
               <a:rPr lang="en-US"/>
               <a:t>Click to edit Master text styles</a:t>
             </a:r>
+            <a:endParaRPr lang="en-US"/>
           </a:p>
           <a:p>
             <a:pPr lvl="1"/>
@@ -2003,6 +1860,7 @@
               <a:rPr lang="en-US"/>
               <a:t>Second level</a:t>
             </a:r>
+            <a:endParaRPr lang="en-US"/>
           </a:p>
           <a:p>
             <a:pPr lvl="2"/>
@@ -2010,6 +1868,7 @@
               <a:rPr lang="en-US"/>
               <a:t>Third level</a:t>
             </a:r>
+            <a:endParaRPr lang="en-US"/>
           </a:p>
           <a:p>
             <a:pPr lvl="3"/>
@@ -2017,6 +1876,7 @@
               <a:rPr lang="en-US"/>
               <a:t>Fourth level</a:t>
             </a:r>
+            <a:endParaRPr lang="en-US"/>
           </a:p>
           <a:p>
             <a:pPr lvl="4"/>
@@ -2030,13 +1890,7 @@
       </p:sp>
       <p:sp>
         <p:nvSpPr>
-          <p:cNvPr id="5" name="Text Placeholder 4">
-            <a:extLst>
-              <a:ext uri="{FF2B5EF4-FFF2-40B4-BE49-F238E27FC236}">
-                <a16:creationId xmlns:a16="http://schemas.microsoft.com/office/drawing/2014/main" id="{7F4946BD-B75C-470D-99D3-F605302156AE}"/>
-              </a:ext>
-            </a:extLst>
-          </p:cNvPr>
+          <p:cNvPr id="5" name="Text Placeholder 4"/>
           <p:cNvSpPr>
             <a:spLocks noGrp="1"/>
           </p:cNvSpPr>
@@ -2096,18 +1950,13 @@
               <a:rPr lang="en-US"/>
               <a:t>Click to edit Master text styles</a:t>
             </a:r>
-          </a:p>
-        </p:txBody>
-      </p:sp>
-      <p:sp>
-        <p:nvSpPr>
-          <p:cNvPr id="6" name="Content Placeholder 5">
-            <a:extLst>
-              <a:ext uri="{FF2B5EF4-FFF2-40B4-BE49-F238E27FC236}">
-                <a16:creationId xmlns:a16="http://schemas.microsoft.com/office/drawing/2014/main" id="{5B2959EF-11BC-42E2-BB54-307A2642469F}"/>
-              </a:ext>
-            </a:extLst>
-          </p:cNvPr>
+            <a:endParaRPr lang="en-US"/>
+          </a:p>
+        </p:txBody>
+      </p:sp>
+      <p:sp>
+        <p:nvSpPr>
+          <p:cNvPr id="6" name="Content Placeholder 5"/>
           <p:cNvSpPr>
             <a:spLocks noGrp="1"/>
           </p:cNvSpPr>
@@ -2130,6 +1979,7 @@
               <a:rPr lang="en-US"/>
               <a:t>Click to edit Master text styles</a:t>
             </a:r>
+            <a:endParaRPr lang="en-US"/>
           </a:p>
           <a:p>
             <a:pPr lvl="1"/>
@@ -2137,6 +1987,7 @@
               <a:rPr lang="en-US"/>
               <a:t>Second level</a:t>
             </a:r>
+            <a:endParaRPr lang="en-US"/>
           </a:p>
           <a:p>
             <a:pPr lvl="2"/>
@@ -2144,6 +1995,7 @@
               <a:rPr lang="en-US"/>
               <a:t>Third level</a:t>
             </a:r>
+            <a:endParaRPr lang="en-US"/>
           </a:p>
           <a:p>
             <a:pPr lvl="3"/>
@@ -2151,6 +2003,7 @@
               <a:rPr lang="en-US"/>
               <a:t>Fourth level</a:t>
             </a:r>
+            <a:endParaRPr lang="en-US"/>
           </a:p>
           <a:p>
             <a:pPr lvl="4"/>
@@ -2164,13 +2017,7 @@
       </p:sp>
       <p:sp>
         <p:nvSpPr>
-          <p:cNvPr id="7" name="Date Placeholder 6">
-            <a:extLst>
-              <a:ext uri="{FF2B5EF4-FFF2-40B4-BE49-F238E27FC236}">
-                <a16:creationId xmlns:a16="http://schemas.microsoft.com/office/drawing/2014/main" id="{A18B43DE-47C6-49C0-A423-D5DC99F4A111}"/>
-              </a:ext>
-            </a:extLst>
-          </p:cNvPr>
+          <p:cNvPr id="7" name="Date Placeholder 6"/>
           <p:cNvSpPr>
             <a:spLocks noGrp="1"/>
           </p:cNvSpPr>
@@ -2185,7 +2032,6 @@
           <a:p>
             <a:fld id="{9D7F0AD8-5C66-43D8-AC43-24C5798B5018}" type="datetimeFigureOut">
               <a:rPr lang="en-IN" smtClean="0"/>
-              <a:t>25-01-2020</a:t>
             </a:fld>
             <a:endParaRPr lang="en-IN"/>
           </a:p>
@@ -2193,13 +2039,7 @@
       </p:sp>
       <p:sp>
         <p:nvSpPr>
-          <p:cNvPr id="8" name="Footer Placeholder 7">
-            <a:extLst>
-              <a:ext uri="{FF2B5EF4-FFF2-40B4-BE49-F238E27FC236}">
-                <a16:creationId xmlns:a16="http://schemas.microsoft.com/office/drawing/2014/main" id="{59AC77E8-2034-4C67-BC22-84B0526FA5E0}"/>
-              </a:ext>
-            </a:extLst>
-          </p:cNvPr>
+          <p:cNvPr id="8" name="Footer Placeholder 7"/>
           <p:cNvSpPr>
             <a:spLocks noGrp="1"/>
           </p:cNvSpPr>
@@ -2218,13 +2058,7 @@
       </p:sp>
       <p:sp>
         <p:nvSpPr>
-          <p:cNvPr id="9" name="Slide Number Placeholder 8">
-            <a:extLst>
-              <a:ext uri="{FF2B5EF4-FFF2-40B4-BE49-F238E27FC236}">
-                <a16:creationId xmlns:a16="http://schemas.microsoft.com/office/drawing/2014/main" id="{EE1D19D3-FEAB-4E76-A8AB-445DF9E03981}"/>
-              </a:ext>
-            </a:extLst>
-          </p:cNvPr>
+          <p:cNvPr id="9" name="Slide Number Placeholder 8"/>
           <p:cNvSpPr>
             <a:spLocks noGrp="1"/>
           </p:cNvSpPr>
@@ -2239,18 +2073,12 @@
           <a:p>
             <a:fld id="{272DB34D-9B08-450E-9C20-58190B62727D}" type="slidenum">
               <a:rPr lang="en-IN" smtClean="0"/>
-              <a:t>‹#›</a:t>
             </a:fld>
             <a:endParaRPr lang="en-IN"/>
           </a:p>
         </p:txBody>
       </p:sp>
     </p:spTree>
-    <p:extLst>
-      <p:ext uri="{BB962C8B-B14F-4D97-AF65-F5344CB8AC3E}">
-        <p14:creationId xmlns:p14="http://schemas.microsoft.com/office/powerpoint/2010/main" val="544868627"/>
-      </p:ext>
-    </p:extLst>
   </p:cSld>
   <p:clrMapOvr>
     <a:masterClrMapping/>
@@ -2277,13 +2105,7 @@
       </p:grpSpPr>
       <p:sp>
         <p:nvSpPr>
-          <p:cNvPr id="2" name="Title 1">
-            <a:extLst>
-              <a:ext uri="{FF2B5EF4-FFF2-40B4-BE49-F238E27FC236}">
-                <a16:creationId xmlns:a16="http://schemas.microsoft.com/office/drawing/2014/main" id="{075D21A3-5CD5-4C6E-A2B1-4B60FE1CC128}"/>
-              </a:ext>
-            </a:extLst>
-          </p:cNvPr>
+          <p:cNvPr id="2" name="Title 1"/>
           <p:cNvSpPr>
             <a:spLocks noGrp="1"/>
           </p:cNvSpPr>
@@ -2306,13 +2128,7 @@
       </p:sp>
       <p:sp>
         <p:nvSpPr>
-          <p:cNvPr id="3" name="Date Placeholder 2">
-            <a:extLst>
-              <a:ext uri="{FF2B5EF4-FFF2-40B4-BE49-F238E27FC236}">
-                <a16:creationId xmlns:a16="http://schemas.microsoft.com/office/drawing/2014/main" id="{6BDE2E7C-3DC4-4DF4-8A4A-A22DFEE1B47A}"/>
-              </a:ext>
-            </a:extLst>
-          </p:cNvPr>
+          <p:cNvPr id="3" name="Date Placeholder 2"/>
           <p:cNvSpPr>
             <a:spLocks noGrp="1"/>
           </p:cNvSpPr>
@@ -2327,7 +2143,6 @@
           <a:p>
             <a:fld id="{9D7F0AD8-5C66-43D8-AC43-24C5798B5018}" type="datetimeFigureOut">
               <a:rPr lang="en-IN" smtClean="0"/>
-              <a:t>25-01-2020</a:t>
             </a:fld>
             <a:endParaRPr lang="en-IN"/>
           </a:p>
@@ -2335,13 +2150,7 @@
       </p:sp>
       <p:sp>
         <p:nvSpPr>
-          <p:cNvPr id="4" name="Footer Placeholder 3">
-            <a:extLst>
-              <a:ext uri="{FF2B5EF4-FFF2-40B4-BE49-F238E27FC236}">
-                <a16:creationId xmlns:a16="http://schemas.microsoft.com/office/drawing/2014/main" id="{08B1B47E-BAE6-499F-B58C-A9CA55FE7D81}"/>
-              </a:ext>
-            </a:extLst>
-          </p:cNvPr>
+          <p:cNvPr id="4" name="Footer Placeholder 3"/>
           <p:cNvSpPr>
             <a:spLocks noGrp="1"/>
           </p:cNvSpPr>
@@ -2360,13 +2169,7 @@
       </p:sp>
       <p:sp>
         <p:nvSpPr>
-          <p:cNvPr id="5" name="Slide Number Placeholder 4">
-            <a:extLst>
-              <a:ext uri="{FF2B5EF4-FFF2-40B4-BE49-F238E27FC236}">
-                <a16:creationId xmlns:a16="http://schemas.microsoft.com/office/drawing/2014/main" id="{CC08A69B-0D01-433D-A81A-B1587010CFB2}"/>
-              </a:ext>
-            </a:extLst>
-          </p:cNvPr>
+          <p:cNvPr id="5" name="Slide Number Placeholder 4"/>
           <p:cNvSpPr>
             <a:spLocks noGrp="1"/>
           </p:cNvSpPr>
@@ -2381,18 +2184,12 @@
           <a:p>
             <a:fld id="{272DB34D-9B08-450E-9C20-58190B62727D}" type="slidenum">
               <a:rPr lang="en-IN" smtClean="0"/>
-              <a:t>‹#›</a:t>
             </a:fld>
             <a:endParaRPr lang="en-IN"/>
           </a:p>
         </p:txBody>
       </p:sp>
     </p:spTree>
-    <p:extLst>
-      <p:ext uri="{BB962C8B-B14F-4D97-AF65-F5344CB8AC3E}">
-        <p14:creationId xmlns:p14="http://schemas.microsoft.com/office/powerpoint/2010/main" val="1122718606"/>
-      </p:ext>
-    </p:extLst>
   </p:cSld>
   <p:clrMapOvr>
     <a:masterClrMapping/>
@@ -2419,13 +2216,7 @@
       </p:grpSpPr>
       <p:sp>
         <p:nvSpPr>
-          <p:cNvPr id="2" name="Date Placeholder 1">
-            <a:extLst>
-              <a:ext uri="{FF2B5EF4-FFF2-40B4-BE49-F238E27FC236}">
-                <a16:creationId xmlns:a16="http://schemas.microsoft.com/office/drawing/2014/main" id="{37BE66C1-EA65-4AD2-AB03-53C99CC62B87}"/>
-              </a:ext>
-            </a:extLst>
-          </p:cNvPr>
+          <p:cNvPr id="2" name="Date Placeholder 1"/>
           <p:cNvSpPr>
             <a:spLocks noGrp="1"/>
           </p:cNvSpPr>
@@ -2440,7 +2231,6 @@
           <a:p>
             <a:fld id="{9D7F0AD8-5C66-43D8-AC43-24C5798B5018}" type="datetimeFigureOut">
               <a:rPr lang="en-IN" smtClean="0"/>
-              <a:t>25-01-2020</a:t>
             </a:fld>
             <a:endParaRPr lang="en-IN"/>
           </a:p>
@@ -2448,13 +2238,7 @@
       </p:sp>
       <p:sp>
         <p:nvSpPr>
-          <p:cNvPr id="3" name="Footer Placeholder 2">
-            <a:extLst>
-              <a:ext uri="{FF2B5EF4-FFF2-40B4-BE49-F238E27FC236}">
-                <a16:creationId xmlns:a16="http://schemas.microsoft.com/office/drawing/2014/main" id="{02B4D120-818C-4CC8-805E-D3A863C651F4}"/>
-              </a:ext>
-            </a:extLst>
-          </p:cNvPr>
+          <p:cNvPr id="3" name="Footer Placeholder 2"/>
           <p:cNvSpPr>
             <a:spLocks noGrp="1"/>
           </p:cNvSpPr>
@@ -2473,13 +2257,7 @@
       </p:sp>
       <p:sp>
         <p:nvSpPr>
-          <p:cNvPr id="4" name="Slide Number Placeholder 3">
-            <a:extLst>
-              <a:ext uri="{FF2B5EF4-FFF2-40B4-BE49-F238E27FC236}">
-                <a16:creationId xmlns:a16="http://schemas.microsoft.com/office/drawing/2014/main" id="{80D52F7B-2036-4BC1-8906-BE9131F4CBFA}"/>
-              </a:ext>
-            </a:extLst>
-          </p:cNvPr>
+          <p:cNvPr id="4" name="Slide Number Placeholder 3"/>
           <p:cNvSpPr>
             <a:spLocks noGrp="1"/>
           </p:cNvSpPr>
@@ -2494,18 +2272,12 @@
           <a:p>
             <a:fld id="{272DB34D-9B08-450E-9C20-58190B62727D}" type="slidenum">
               <a:rPr lang="en-IN" smtClean="0"/>
-              <a:t>‹#›</a:t>
             </a:fld>
             <a:endParaRPr lang="en-IN"/>
           </a:p>
         </p:txBody>
       </p:sp>
     </p:spTree>
-    <p:extLst>
-      <p:ext uri="{BB962C8B-B14F-4D97-AF65-F5344CB8AC3E}">
-        <p14:creationId xmlns:p14="http://schemas.microsoft.com/office/powerpoint/2010/main" val="1044036891"/>
-      </p:ext>
-    </p:extLst>
   </p:cSld>
   <p:clrMapOvr>
     <a:masterClrMapping/>
@@ -2532,13 +2304,7 @@
       </p:grpSpPr>
       <p:sp>
         <p:nvSpPr>
-          <p:cNvPr id="2" name="Title 1">
-            <a:extLst>
-              <a:ext uri="{FF2B5EF4-FFF2-40B4-BE49-F238E27FC236}">
-                <a16:creationId xmlns:a16="http://schemas.microsoft.com/office/drawing/2014/main" id="{C5FEED38-4292-44DF-AB70-518CF7B6DE32}"/>
-              </a:ext>
-            </a:extLst>
-          </p:cNvPr>
+          <p:cNvPr id="2" name="Title 1"/>
           <p:cNvSpPr>
             <a:spLocks noGrp="1"/>
           </p:cNvSpPr>
@@ -2570,13 +2336,7 @@
       </p:sp>
       <p:sp>
         <p:nvSpPr>
-          <p:cNvPr id="3" name="Content Placeholder 2">
-            <a:extLst>
-              <a:ext uri="{FF2B5EF4-FFF2-40B4-BE49-F238E27FC236}">
-                <a16:creationId xmlns:a16="http://schemas.microsoft.com/office/drawing/2014/main" id="{532DDA75-8A21-46EF-B7F3-D4D6DD82BF4E}"/>
-              </a:ext>
-            </a:extLst>
-          </p:cNvPr>
+          <p:cNvPr id="3" name="Content Placeholder 2"/>
           <p:cNvSpPr>
             <a:spLocks noGrp="1"/>
           </p:cNvSpPr>
@@ -2627,6 +2387,7 @@
               <a:rPr lang="en-US"/>
               <a:t>Click to edit Master text styles</a:t>
             </a:r>
+            <a:endParaRPr lang="en-US"/>
           </a:p>
           <a:p>
             <a:pPr lvl="1"/>
@@ -2634,6 +2395,7 @@
               <a:rPr lang="en-US"/>
               <a:t>Second level</a:t>
             </a:r>
+            <a:endParaRPr lang="en-US"/>
           </a:p>
           <a:p>
             <a:pPr lvl="2"/>
@@ -2641,6 +2403,7 @@
               <a:rPr lang="en-US"/>
               <a:t>Third level</a:t>
             </a:r>
+            <a:endParaRPr lang="en-US"/>
           </a:p>
           <a:p>
             <a:pPr lvl="3"/>
@@ -2648,6 +2411,7 @@
               <a:rPr lang="en-US"/>
               <a:t>Fourth level</a:t>
             </a:r>
+            <a:endParaRPr lang="en-US"/>
           </a:p>
           <a:p>
             <a:pPr lvl="4"/>
@@ -2661,13 +2425,7 @@
       </p:sp>
       <p:sp>
         <p:nvSpPr>
-          <p:cNvPr id="4" name="Text Placeholder 3">
-            <a:extLst>
-              <a:ext uri="{FF2B5EF4-FFF2-40B4-BE49-F238E27FC236}">
-                <a16:creationId xmlns:a16="http://schemas.microsoft.com/office/drawing/2014/main" id="{3A8A66EE-AF7E-4900-BD80-924FF37BE970}"/>
-              </a:ext>
-            </a:extLst>
-          </p:cNvPr>
+          <p:cNvPr id="4" name="Text Placeholder 3"/>
           <p:cNvSpPr>
             <a:spLocks noGrp="1"/>
           </p:cNvSpPr>
@@ -2727,18 +2485,13 @@
               <a:rPr lang="en-US"/>
               <a:t>Click to edit Master text styles</a:t>
             </a:r>
-          </a:p>
-        </p:txBody>
-      </p:sp>
-      <p:sp>
-        <p:nvSpPr>
-          <p:cNvPr id="5" name="Date Placeholder 4">
-            <a:extLst>
-              <a:ext uri="{FF2B5EF4-FFF2-40B4-BE49-F238E27FC236}">
-                <a16:creationId xmlns:a16="http://schemas.microsoft.com/office/drawing/2014/main" id="{C227A94C-7F51-4CBB-9F36-DA2B0777E437}"/>
-              </a:ext>
-            </a:extLst>
-          </p:cNvPr>
+            <a:endParaRPr lang="en-US"/>
+          </a:p>
+        </p:txBody>
+      </p:sp>
+      <p:sp>
+        <p:nvSpPr>
+          <p:cNvPr id="5" name="Date Placeholder 4"/>
           <p:cNvSpPr>
             <a:spLocks noGrp="1"/>
           </p:cNvSpPr>
@@ -2753,7 +2506,6 @@
           <a:p>
             <a:fld id="{9D7F0AD8-5C66-43D8-AC43-24C5798B5018}" type="datetimeFigureOut">
               <a:rPr lang="en-IN" smtClean="0"/>
-              <a:t>25-01-2020</a:t>
             </a:fld>
             <a:endParaRPr lang="en-IN"/>
           </a:p>
@@ -2761,13 +2513,7 @@
       </p:sp>
       <p:sp>
         <p:nvSpPr>
-          <p:cNvPr id="6" name="Footer Placeholder 5">
-            <a:extLst>
-              <a:ext uri="{FF2B5EF4-FFF2-40B4-BE49-F238E27FC236}">
-                <a16:creationId xmlns:a16="http://schemas.microsoft.com/office/drawing/2014/main" id="{8D7C6F4E-8251-44AC-9827-89766B68E382}"/>
-              </a:ext>
-            </a:extLst>
-          </p:cNvPr>
+          <p:cNvPr id="6" name="Footer Placeholder 5"/>
           <p:cNvSpPr>
             <a:spLocks noGrp="1"/>
           </p:cNvSpPr>
@@ -2786,13 +2532,7 @@
       </p:sp>
       <p:sp>
         <p:nvSpPr>
-          <p:cNvPr id="7" name="Slide Number Placeholder 6">
-            <a:extLst>
-              <a:ext uri="{FF2B5EF4-FFF2-40B4-BE49-F238E27FC236}">
-                <a16:creationId xmlns:a16="http://schemas.microsoft.com/office/drawing/2014/main" id="{CE7ACE9C-0A9B-45FA-9FC1-3F1A7553C303}"/>
-              </a:ext>
-            </a:extLst>
-          </p:cNvPr>
+          <p:cNvPr id="7" name="Slide Number Placeholder 6"/>
           <p:cNvSpPr>
             <a:spLocks noGrp="1"/>
           </p:cNvSpPr>
@@ -2807,18 +2547,12 @@
           <a:p>
             <a:fld id="{272DB34D-9B08-450E-9C20-58190B62727D}" type="slidenum">
               <a:rPr lang="en-IN" smtClean="0"/>
-              <a:t>‹#›</a:t>
             </a:fld>
             <a:endParaRPr lang="en-IN"/>
           </a:p>
         </p:txBody>
       </p:sp>
     </p:spTree>
-    <p:extLst>
-      <p:ext uri="{BB962C8B-B14F-4D97-AF65-F5344CB8AC3E}">
-        <p14:creationId xmlns:p14="http://schemas.microsoft.com/office/powerpoint/2010/main" val="4084577071"/>
-      </p:ext>
-    </p:extLst>
   </p:cSld>
   <p:clrMapOvr>
     <a:masterClrMapping/>
@@ -2845,13 +2579,7 @@
       </p:grpSpPr>
       <p:sp>
         <p:nvSpPr>
-          <p:cNvPr id="2" name="Title 1">
-            <a:extLst>
-              <a:ext uri="{FF2B5EF4-FFF2-40B4-BE49-F238E27FC236}">
-                <a16:creationId xmlns:a16="http://schemas.microsoft.com/office/drawing/2014/main" id="{DD488F94-2DBE-4D6E-BCDE-23DF99135E49}"/>
-              </a:ext>
-            </a:extLst>
-          </p:cNvPr>
+          <p:cNvPr id="2" name="Title 1"/>
           <p:cNvSpPr>
             <a:spLocks noGrp="1"/>
           </p:cNvSpPr>
@@ -2883,13 +2611,7 @@
       </p:sp>
       <p:sp>
         <p:nvSpPr>
-          <p:cNvPr id="3" name="Picture Placeholder 2">
-            <a:extLst>
-              <a:ext uri="{FF2B5EF4-FFF2-40B4-BE49-F238E27FC236}">
-                <a16:creationId xmlns:a16="http://schemas.microsoft.com/office/drawing/2014/main" id="{4B6AE890-9660-4700-A950-CA0C8A8170BD}"/>
-              </a:ext>
-            </a:extLst>
-          </p:cNvPr>
+          <p:cNvPr id="3" name="Picture Placeholder 2"/>
           <p:cNvSpPr>
             <a:spLocks noGrp="1"/>
           </p:cNvSpPr>
@@ -2950,13 +2672,7 @@
       </p:sp>
       <p:sp>
         <p:nvSpPr>
-          <p:cNvPr id="4" name="Text Placeholder 3">
-            <a:extLst>
-              <a:ext uri="{FF2B5EF4-FFF2-40B4-BE49-F238E27FC236}">
-                <a16:creationId xmlns:a16="http://schemas.microsoft.com/office/drawing/2014/main" id="{5DE29610-8CC7-4997-B66C-88087AB1FCE2}"/>
-              </a:ext>
-            </a:extLst>
-          </p:cNvPr>
+          <p:cNvPr id="4" name="Text Placeholder 3"/>
           <p:cNvSpPr>
             <a:spLocks noGrp="1"/>
           </p:cNvSpPr>
@@ -3016,18 +2732,13 @@
               <a:rPr lang="en-US"/>
               <a:t>Click to edit Master text styles</a:t>
             </a:r>
-          </a:p>
-        </p:txBody>
-      </p:sp>
-      <p:sp>
-        <p:nvSpPr>
-          <p:cNvPr id="5" name="Date Placeholder 4">
-            <a:extLst>
-              <a:ext uri="{FF2B5EF4-FFF2-40B4-BE49-F238E27FC236}">
-                <a16:creationId xmlns:a16="http://schemas.microsoft.com/office/drawing/2014/main" id="{3114F157-735B-42DD-83FD-D03718F2FBC2}"/>
-              </a:ext>
-            </a:extLst>
-          </p:cNvPr>
+            <a:endParaRPr lang="en-US"/>
+          </a:p>
+        </p:txBody>
+      </p:sp>
+      <p:sp>
+        <p:nvSpPr>
+          <p:cNvPr id="5" name="Date Placeholder 4"/>
           <p:cNvSpPr>
             <a:spLocks noGrp="1"/>
           </p:cNvSpPr>
@@ -3042,7 +2753,6 @@
           <a:p>
             <a:fld id="{9D7F0AD8-5C66-43D8-AC43-24C5798B5018}" type="datetimeFigureOut">
               <a:rPr lang="en-IN" smtClean="0"/>
-              <a:t>25-01-2020</a:t>
             </a:fld>
             <a:endParaRPr lang="en-IN"/>
           </a:p>
@@ -3050,13 +2760,7 @@
       </p:sp>
       <p:sp>
         <p:nvSpPr>
-          <p:cNvPr id="6" name="Footer Placeholder 5">
-            <a:extLst>
-              <a:ext uri="{FF2B5EF4-FFF2-40B4-BE49-F238E27FC236}">
-                <a16:creationId xmlns:a16="http://schemas.microsoft.com/office/drawing/2014/main" id="{B23C5C44-04EA-4BDB-BC58-ECD097479531}"/>
-              </a:ext>
-            </a:extLst>
-          </p:cNvPr>
+          <p:cNvPr id="6" name="Footer Placeholder 5"/>
           <p:cNvSpPr>
             <a:spLocks noGrp="1"/>
           </p:cNvSpPr>
@@ -3075,13 +2779,7 @@
       </p:sp>
       <p:sp>
         <p:nvSpPr>
-          <p:cNvPr id="7" name="Slide Number Placeholder 6">
-            <a:extLst>
-              <a:ext uri="{FF2B5EF4-FFF2-40B4-BE49-F238E27FC236}">
-                <a16:creationId xmlns:a16="http://schemas.microsoft.com/office/drawing/2014/main" id="{BD773D7D-B301-428B-BFAF-0E1C50AEFFDC}"/>
-              </a:ext>
-            </a:extLst>
-          </p:cNvPr>
+          <p:cNvPr id="7" name="Slide Number Placeholder 6"/>
           <p:cNvSpPr>
             <a:spLocks noGrp="1"/>
           </p:cNvSpPr>
@@ -3096,18 +2794,12 @@
           <a:p>
             <a:fld id="{272DB34D-9B08-450E-9C20-58190B62727D}" type="slidenum">
               <a:rPr lang="en-IN" smtClean="0"/>
-              <a:t>‹#›</a:t>
             </a:fld>
             <a:endParaRPr lang="en-IN"/>
           </a:p>
         </p:txBody>
       </p:sp>
     </p:spTree>
-    <p:extLst>
-      <p:ext uri="{BB962C8B-B14F-4D97-AF65-F5344CB8AC3E}">
-        <p14:creationId xmlns:p14="http://schemas.microsoft.com/office/powerpoint/2010/main" val="2311512038"/>
-      </p:ext>
-    </p:extLst>
   </p:cSld>
   <p:clrMapOvr>
     <a:masterClrMapping/>
@@ -3139,13 +2831,7 @@
       </p:grpSpPr>
       <p:sp>
         <p:nvSpPr>
-          <p:cNvPr id="2" name="Title Placeholder 1">
-            <a:extLst>
-              <a:ext uri="{FF2B5EF4-FFF2-40B4-BE49-F238E27FC236}">
-                <a16:creationId xmlns:a16="http://schemas.microsoft.com/office/drawing/2014/main" id="{5A49600B-2F2A-406D-805B-CBCA29EAE8D2}"/>
-              </a:ext>
-            </a:extLst>
-          </p:cNvPr>
+          <p:cNvPr id="2" name="Title Placeholder 1"/>
           <p:cNvSpPr>
             <a:spLocks noGrp="1"/>
           </p:cNvSpPr>
@@ -3178,13 +2864,7 @@
       </p:sp>
       <p:sp>
         <p:nvSpPr>
-          <p:cNvPr id="3" name="Text Placeholder 2">
-            <a:extLst>
-              <a:ext uri="{FF2B5EF4-FFF2-40B4-BE49-F238E27FC236}">
-                <a16:creationId xmlns:a16="http://schemas.microsoft.com/office/drawing/2014/main" id="{1765BD0E-548B-42AF-B295-947376CED1D7}"/>
-              </a:ext>
-            </a:extLst>
-          </p:cNvPr>
+          <p:cNvPr id="3" name="Text Placeholder 2"/>
           <p:cNvSpPr>
             <a:spLocks noGrp="1"/>
           </p:cNvSpPr>
@@ -3212,6 +2892,7 @@
               <a:rPr lang="en-US"/>
               <a:t>Click to edit Master text styles</a:t>
             </a:r>
+            <a:endParaRPr lang="en-US"/>
           </a:p>
           <a:p>
             <a:pPr lvl="1"/>
@@ -3219,6 +2900,7 @@
               <a:rPr lang="en-US"/>
               <a:t>Second level</a:t>
             </a:r>
+            <a:endParaRPr lang="en-US"/>
           </a:p>
           <a:p>
             <a:pPr lvl="2"/>
@@ -3226,6 +2908,7 @@
               <a:rPr lang="en-US"/>
               <a:t>Third level</a:t>
             </a:r>
+            <a:endParaRPr lang="en-US"/>
           </a:p>
           <a:p>
             <a:pPr lvl="3"/>
@@ -3233,6 +2916,7 @@
               <a:rPr lang="en-US"/>
               <a:t>Fourth level</a:t>
             </a:r>
+            <a:endParaRPr lang="en-US"/>
           </a:p>
           <a:p>
             <a:pPr lvl="4"/>
@@ -3246,13 +2930,7 @@
       </p:sp>
       <p:sp>
         <p:nvSpPr>
-          <p:cNvPr id="4" name="Date Placeholder 3">
-            <a:extLst>
-              <a:ext uri="{FF2B5EF4-FFF2-40B4-BE49-F238E27FC236}">
-                <a16:creationId xmlns:a16="http://schemas.microsoft.com/office/drawing/2014/main" id="{07FF5972-07DC-473B-B3BE-F4B386321B64}"/>
-              </a:ext>
-            </a:extLst>
-          </p:cNvPr>
+          <p:cNvPr id="4" name="Date Placeholder 3"/>
           <p:cNvSpPr>
             <a:spLocks noGrp="1"/>
           </p:cNvSpPr>
@@ -3285,7 +2963,6 @@
           <a:p>
             <a:fld id="{9D7F0AD8-5C66-43D8-AC43-24C5798B5018}" type="datetimeFigureOut">
               <a:rPr lang="en-IN" smtClean="0"/>
-              <a:t>25-01-2020</a:t>
             </a:fld>
             <a:endParaRPr lang="en-IN"/>
           </a:p>
@@ -3293,13 +2970,7 @@
       </p:sp>
       <p:sp>
         <p:nvSpPr>
-          <p:cNvPr id="5" name="Footer Placeholder 4">
-            <a:extLst>
-              <a:ext uri="{FF2B5EF4-FFF2-40B4-BE49-F238E27FC236}">
-                <a16:creationId xmlns:a16="http://schemas.microsoft.com/office/drawing/2014/main" id="{B6E53D73-F458-4B8B-8642-B3317B46D9AC}"/>
-              </a:ext>
-            </a:extLst>
-          </p:cNvPr>
+          <p:cNvPr id="5" name="Footer Placeholder 4"/>
           <p:cNvSpPr>
             <a:spLocks noGrp="1"/>
           </p:cNvSpPr>
@@ -3336,13 +3007,7 @@
       </p:sp>
       <p:sp>
         <p:nvSpPr>
-          <p:cNvPr id="6" name="Slide Number Placeholder 5">
-            <a:extLst>
-              <a:ext uri="{FF2B5EF4-FFF2-40B4-BE49-F238E27FC236}">
-                <a16:creationId xmlns:a16="http://schemas.microsoft.com/office/drawing/2014/main" id="{D23AA3B0-9C55-46EB-B1ED-8D9774C47D13}"/>
-              </a:ext>
-            </a:extLst>
-          </p:cNvPr>
+          <p:cNvPr id="6" name="Slide Number Placeholder 5"/>
           <p:cNvSpPr>
             <a:spLocks noGrp="1"/>
           </p:cNvSpPr>
@@ -3375,18 +3040,12 @@
           <a:p>
             <a:fld id="{272DB34D-9B08-450E-9C20-58190B62727D}" type="slidenum">
               <a:rPr lang="en-IN" smtClean="0"/>
-              <a:t>‹#›</a:t>
             </a:fld>
             <a:endParaRPr lang="en-IN"/>
           </a:p>
         </p:txBody>
       </p:sp>
     </p:spTree>
-    <p:extLst>
-      <p:ext uri="{BB962C8B-B14F-4D97-AF65-F5344CB8AC3E}">
-        <p14:creationId xmlns:p14="http://schemas.microsoft.com/office/powerpoint/2010/main" val="3729508250"/>
-      </p:ext>
-    </p:extLst>
   </p:cSld>
   <p:clrMap bg1="lt1" tx1="dk1" bg2="lt2" tx2="dk2" accent1="accent1" accent2="accent2" accent3="accent3" accent4="accent4" accent5="accent5" accent6="accent6" hlink="hlink" folHlink="folHlink"/>
   <p:sldLayoutIdLst>
@@ -3704,13 +3363,7 @@
       </p:grpSpPr>
       <p:sp>
         <p:nvSpPr>
-          <p:cNvPr id="4" name="Rectangle 3">
-            <a:extLst>
-              <a:ext uri="{FF2B5EF4-FFF2-40B4-BE49-F238E27FC236}">
-                <a16:creationId xmlns:a16="http://schemas.microsoft.com/office/drawing/2014/main" id="{2D599A28-784F-4ED7-BAE1-A58C30003295}"/>
-              </a:ext>
-            </a:extLst>
-          </p:cNvPr>
+          <p:cNvPr id="4" name="Rectangle 3"/>
           <p:cNvSpPr/>
           <p:nvPr/>
         </p:nvSpPr>
@@ -3942,6 +3595,7 @@
               <a:rPr lang="en-IN" sz="1700" dirty="0"/>
               <a:t> The solution can be classified into 2  sections </a:t>
             </a:r>
+            <a:endParaRPr lang="en-IN" sz="1700" dirty="0"/>
           </a:p>
           <a:p>
             <a:pPr algn="ctr">
@@ -3957,6 +3611,7 @@
               <a:rPr lang="en-IN" sz="1700" b="1" u="sng" dirty="0"/>
               <a:t>FARMERS</a:t>
             </a:r>
+            <a:endParaRPr lang="en-IN" sz="1700" b="1" u="sng" dirty="0"/>
           </a:p>
           <a:p>
             <a:pPr marL="285750" indent="-285750">
@@ -3986,6 +3641,7 @@
               <a:rPr lang="en-IN" sz="1700" dirty="0"/>
               <a:t> ).</a:t>
             </a:r>
+            <a:endParaRPr lang="en-IN" sz="1700" dirty="0"/>
           </a:p>
           <a:p>
             <a:pPr marL="285750" indent="-285750">
@@ -3999,6 +3655,7 @@
               <a:rPr lang="en-IN" sz="1700" dirty="0"/>
               <a:t>The farmer can insert, update and delete product details and send delivery information (such as Packaging , Dispatch , On the Way , Delivered ) via SMS ,Call Centre  and Website .</a:t>
             </a:r>
+            <a:endParaRPr lang="en-IN" sz="1700" dirty="0"/>
           </a:p>
           <a:p>
             <a:pPr marL="285750" indent="-285750">
@@ -4012,6 +3669,7 @@
               <a:rPr lang="en-IN" sz="1700" dirty="0"/>
               <a:t>For larger quantities, farmer can create groups and the admin of the group will be responsible for all the activities.</a:t>
             </a:r>
+            <a:endParaRPr lang="en-IN" sz="1700" dirty="0"/>
           </a:p>
           <a:p>
             <a:pPr marL="285750" indent="-285750">
@@ -4025,6 +3683,7 @@
               <a:rPr lang="en-IN" sz="1700" dirty="0"/>
               <a:t>MSP(Minimum Selling Price) will be shown  to the farmers when he enters the price for his product .</a:t>
             </a:r>
+            <a:endParaRPr lang="en-IN" sz="1700" dirty="0"/>
           </a:p>
           <a:p>
             <a:pPr marL="285750" indent="-285750">
@@ -4038,6 +3697,7 @@
               <a:rPr lang="en-IN" sz="1700" dirty="0"/>
               <a:t>The farmer has to enter the expiry date and as the expiry date  arrives the price will decrease by a certain percentage.</a:t>
             </a:r>
+            <a:endParaRPr lang="en-IN" sz="1700" dirty="0"/>
           </a:p>
           <a:p>
             <a:pPr marL="285750" indent="-285750">
@@ -4051,6 +3711,7 @@
               <a:rPr lang="en-IN" sz="1700" dirty="0"/>
               <a:t>The farmer can view all his transactions  and can receive payments  from the buyer via Paytm , Cash On Delivery or directly to his bank account</a:t>
             </a:r>
+            <a:endParaRPr lang="en-IN" sz="1700" dirty="0"/>
           </a:p>
           <a:p>
             <a:pPr marL="285750" indent="-285750">
@@ -4064,6 +3725,7 @@
               <a:rPr lang="en-IN" sz="1700" dirty="0"/>
               <a:t> In the initial stages the farmer doesn’t have to pay any commission, until he has earned a significant amount through the application.</a:t>
             </a:r>
+            <a:endParaRPr lang="en-IN" sz="1700" dirty="0"/>
           </a:p>
           <a:p>
             <a:pPr marL="285750" indent="-285750">
@@ -4089,13 +3751,7 @@
       </p:sp>
       <p:sp>
         <p:nvSpPr>
-          <p:cNvPr id="5" name="Rectangle 4">
-            <a:extLst>
-              <a:ext uri="{FF2B5EF4-FFF2-40B4-BE49-F238E27FC236}">
-                <a16:creationId xmlns:a16="http://schemas.microsoft.com/office/drawing/2014/main" id="{11F87C8B-02DC-4C34-946E-2CFB718F1349}"/>
-              </a:ext>
-            </a:extLst>
-          </p:cNvPr>
+          <p:cNvPr id="5" name="Rectangle 4"/>
           <p:cNvSpPr/>
           <p:nvPr/>
         </p:nvSpPr>
@@ -4126,15 +3782,18 @@
               </a:rPr>
               <a:t>.</a:t>
             </a:r>
+            <a:endParaRPr lang="en-IN" sz="1200" dirty="0">
+              <a:solidFill>
+                <a:prstClr val="black"/>
+              </a:solidFill>
+              <a:latin typeface="Calibri" panose="020F0502020204030204" pitchFamily="34" charset="0"/>
+              <a:ea typeface="Calibri" panose="020F0502020204030204" pitchFamily="34" charset="0"/>
+              <a:cs typeface="Times New Roman" panose="02020603050405020304" pitchFamily="18" charset="0"/>
+            </a:endParaRPr>
           </a:p>
         </p:txBody>
       </p:sp>
     </p:spTree>
-    <p:extLst>
-      <p:ext uri="{BB962C8B-B14F-4D97-AF65-F5344CB8AC3E}">
-        <p14:creationId xmlns:p14="http://schemas.microsoft.com/office/powerpoint/2010/main" val="4010881242"/>
-      </p:ext>
-    </p:extLst>
   </p:cSld>
   <p:clrMapOvr>
     <a:masterClrMapping/>
@@ -4161,13 +3820,7 @@
       </p:grpSpPr>
       <p:sp>
         <p:nvSpPr>
-          <p:cNvPr id="4" name="Text Placeholder 3">
-            <a:extLst>
-              <a:ext uri="{FF2B5EF4-FFF2-40B4-BE49-F238E27FC236}">
-                <a16:creationId xmlns:a16="http://schemas.microsoft.com/office/drawing/2014/main" id="{A623F6EC-7BDC-4CF2-9AFD-C4FC6B2A0B45}"/>
-              </a:ext>
-            </a:extLst>
-          </p:cNvPr>
+          <p:cNvPr id="4" name="Text Placeholder 3"/>
           <p:cNvSpPr>
             <a:spLocks noGrp="1"/>
           </p:cNvSpPr>
@@ -4192,6 +3845,7 @@
               <a:rPr lang="en-IN" sz="7200" b="1" u="sng" dirty="0"/>
               <a:t>Buyer</a:t>
             </a:r>
+            <a:endParaRPr lang="en-IN" sz="7200" b="1" u="sng" dirty="0"/>
           </a:p>
           <a:p>
             <a:pPr marL="285750" indent="-285750">
@@ -4202,6 +3856,7 @@
               <a:rPr lang="en-IN" sz="7200" dirty="0"/>
               <a:t>The buyer can search  products categorically  by price or by location(state &amp; district).</a:t>
             </a:r>
+            <a:endParaRPr lang="en-IN" sz="7200" dirty="0"/>
           </a:p>
           <a:p>
             <a:pPr marL="285750" indent="-285750">
@@ -4212,6 +3867,7 @@
               <a:rPr lang="en-IN" sz="7200" dirty="0"/>
               <a:t>The buyer can make use of bestsellers and recommendation system (frequently bought together) ,review(ratings &amp; comments) thereby allowing the user to buy best products.</a:t>
             </a:r>
+            <a:endParaRPr lang="en-IN" sz="7200" dirty="0"/>
           </a:p>
           <a:p>
             <a:pPr marL="285750" indent="-285750">
@@ -4222,6 +3878,7 @@
               <a:rPr lang="en-IN" sz="7200" dirty="0"/>
               <a:t>If five negative reviews is noted against a farmer ,the verification team will verify the farmer and if he’s found guilty ,a certain amount of penalty will be  extracted from the farmer and  will be given to the buyer as compensation. </a:t>
             </a:r>
+            <a:endParaRPr lang="en-IN" sz="7200" dirty="0"/>
           </a:p>
           <a:p>
             <a:pPr marL="285750" indent="-285750">
@@ -4232,6 +3889,7 @@
               <a:rPr lang="en-IN" sz="7200" dirty="0"/>
               <a:t>The subscription feature helps the buyer to buy the products which he requires on a daily basis, by ordering the product only once and specifying the duration.</a:t>
             </a:r>
+            <a:endParaRPr lang="en-IN" sz="7200" dirty="0"/>
           </a:p>
           <a:p>
             <a:pPr marL="285750" indent="-285750">
@@ -4242,6 +3900,7 @@
               <a:rPr lang="en-IN" sz="7200" dirty="0"/>
               <a:t>The bookmark feature will display the products of bookmarked farmer in his homepage and if buyer chooses to receive notifications (SMS) , he will receive the same.</a:t>
             </a:r>
+            <a:endParaRPr lang="en-IN" sz="7200" dirty="0"/>
           </a:p>
           <a:p>
             <a:pPr marL="285750" indent="-285750">
@@ -4252,6 +3911,7 @@
               <a:rPr lang="en-IN" sz="7200" dirty="0"/>
               <a:t>If scarcity of particular product occurs then the  buyer will be provided with closest locations to his vicinity , also the buyer can keep track of his transactions and delivery.</a:t>
             </a:r>
+            <a:endParaRPr lang="en-IN" sz="7200" dirty="0"/>
           </a:p>
           <a:p>
             <a:pPr marL="285750" indent="-285750">
@@ -4262,6 +3922,7 @@
               <a:rPr lang="en-IN" sz="7200" dirty="0"/>
               <a:t>The chat system helps the buyer to negotiate with the farmer, and that price is re-entered by the farmer during farmer verification once the order is placed and is re-verified by the buyer.</a:t>
             </a:r>
+            <a:endParaRPr lang="en-IN" sz="7200" dirty="0"/>
           </a:p>
           <a:p>
             <a:pPr marL="285750" indent="-285750">
@@ -4276,6 +3937,7 @@
               <a:rPr lang="en-IN" sz="4500" dirty="0"/>
               <a:t>.</a:t>
             </a:r>
+            <a:endParaRPr lang="en-IN" sz="4500" dirty="0"/>
           </a:p>
           <a:p>
             <a:pPr marL="285750" indent="-285750">
@@ -4291,20 +3953,14 @@
       </p:sp>
       <p:pic>
         <p:nvPicPr>
-          <p:cNvPr id="10" name="Picture 9">
-            <a:extLst>
-              <a:ext uri="{FF2B5EF4-FFF2-40B4-BE49-F238E27FC236}">
-                <a16:creationId xmlns:a16="http://schemas.microsoft.com/office/drawing/2014/main" id="{7FC92398-A21D-40C7-B62D-ED871491637F}"/>
-              </a:ext>
-            </a:extLst>
-          </p:cNvPr>
+          <p:cNvPr id="10" name="Picture 9"/>
           <p:cNvPicPr>
             <a:picLocks noChangeAspect="1"/>
           </p:cNvPicPr>
           <p:nvPr/>
         </p:nvPicPr>
         <p:blipFill>
-          <a:blip r:embed="rId2">
+          <a:blip r:embed="rId1">
             <a:extLst>
               <a:ext uri="{28A0092B-C50C-407E-A947-70E740481C1C}">
                 <a14:useLocalDpi xmlns:a14="http://schemas.microsoft.com/office/drawing/2010/main" val="0"/>
@@ -4317,8 +3973,8 @@
         </p:blipFill>
         <p:spPr>
           <a:xfrm>
-            <a:off x="8180634" y="0"/>
-            <a:ext cx="3942131" cy="5514975"/>
+            <a:off x="8064500" y="0"/>
+            <a:ext cx="4058285" cy="5514975"/>
           </a:xfrm>
           <a:prstGeom prst="rect">
             <a:avLst/>
@@ -4327,13 +3983,7 @@
       </p:pic>
       <p:sp>
         <p:nvSpPr>
-          <p:cNvPr id="6" name="TextBox 5">
-            <a:extLst>
-              <a:ext uri="{FF2B5EF4-FFF2-40B4-BE49-F238E27FC236}">
-                <a16:creationId xmlns:a16="http://schemas.microsoft.com/office/drawing/2014/main" id="{238366A7-0444-412B-9BF5-1BA98BBDD961}"/>
-              </a:ext>
-            </a:extLst>
-          </p:cNvPr>
+          <p:cNvPr id="6" name="TextBox 5"/>
           <p:cNvSpPr txBox="1"/>
           <p:nvPr/>
         </p:nvSpPr>
@@ -4358,6 +4008,7 @@
               <a:rPr lang="en-IN" b="1" u="sng" dirty="0"/>
               <a:t>TECHNOLOGY STACK </a:t>
             </a:r>
+            <a:endParaRPr lang="en-IN" b="1" u="sng" dirty="0"/>
           </a:p>
           <a:p>
             <a:pPr marL="285750" indent="-285750">
@@ -4380,6 +4031,7 @@
               <a:rPr lang="en-IN" dirty="0"/>
               <a:t>.</a:t>
             </a:r>
+            <a:endParaRPr lang="en-IN" dirty="0"/>
           </a:p>
           <a:p>
             <a:pPr marL="285750" indent="-285750">
@@ -4390,6 +4042,7 @@
               <a:rPr lang="en-IN" dirty="0"/>
               <a:t>Programming languages: - Python.</a:t>
             </a:r>
+            <a:endParaRPr lang="en-IN" dirty="0"/>
           </a:p>
           <a:p>
             <a:pPr marL="285750" indent="-285750">
@@ -4400,15 +4053,11 @@
               <a:rPr lang="en-IN" dirty="0"/>
               <a:t>Mobile Development:-Android Studio, Android SDK and Jellybean version and above.</a:t>
             </a:r>
+            <a:endParaRPr lang="en-IN" dirty="0"/>
           </a:p>
         </p:txBody>
       </p:sp>
     </p:spTree>
-    <p:extLst>
-      <p:ext uri="{BB962C8B-B14F-4D97-AF65-F5344CB8AC3E}">
-        <p14:creationId xmlns:p14="http://schemas.microsoft.com/office/powerpoint/2010/main" val="412347013"/>
-      </p:ext>
-    </p:extLst>
   </p:cSld>
   <p:clrMapOvr>
     <a:masterClrMapping/>
@@ -4435,13 +4084,7 @@
       </p:grpSpPr>
       <p:sp>
         <p:nvSpPr>
-          <p:cNvPr id="4" name="Text Placeholder 3">
-            <a:extLst>
-              <a:ext uri="{FF2B5EF4-FFF2-40B4-BE49-F238E27FC236}">
-                <a16:creationId xmlns:a16="http://schemas.microsoft.com/office/drawing/2014/main" id="{41BB9D98-1B24-4A57-B78C-DB87F8D114D5}"/>
-              </a:ext>
-            </a:extLst>
-          </p:cNvPr>
+          <p:cNvPr id="4" name="Text Placeholder 3"/>
           <p:cNvSpPr>
             <a:spLocks noGrp="1"/>
           </p:cNvSpPr>
@@ -4472,6 +4115,10 @@
               </a:rPr>
               <a:t>Backend Development: -MySQL Database and Firebase.</a:t>
             </a:r>
+            <a:endParaRPr lang="en-IN" dirty="0">
+              <a:latin typeface="Calibri" panose="020F0502020204030204" pitchFamily="34" charset="0"/>
+              <a:cs typeface="Calibri" panose="020F0502020204030204" pitchFamily="34" charset="0"/>
+            </a:endParaRPr>
           </a:p>
           <a:p>
             <a:pPr marL="285750" indent="-285750">
@@ -4483,7 +4130,7 @@
                 <a:latin typeface="Calibri" panose="020F0502020204030204" pitchFamily="34" charset="0"/>
                 <a:cs typeface="Calibri" panose="020F0502020204030204" pitchFamily="34" charset="0"/>
               </a:rPr>
-              <a:t> Modern Technology:- Big Data , Data Analytics , Visualization, Machine 			learning .</a:t>
+              <a:t>Modern Technology:- Big Data , Data Analytics , Visualization, Machine 			learning .</a:t>
             </a:r>
             <a:endParaRPr lang="en-IN" b="1" u="sng" dirty="0"/>
           </a:p>
@@ -4503,6 +4150,7 @@
               <a:rPr lang="en-IN" dirty="0"/>
               <a:t>The farmer must possess a basic phone and legal documents.</a:t>
             </a:r>
+            <a:endParaRPr lang="en-IN" dirty="0"/>
           </a:p>
           <a:p>
             <a:pPr marL="285750" indent="-285750">
@@ -4513,6 +4161,7 @@
               <a:rPr lang="en-IN" dirty="0"/>
               <a:t>This application can be installed in all devices having Android version Jellybean and higher.</a:t>
             </a:r>
+            <a:endParaRPr lang="en-IN" dirty="0"/>
           </a:p>
           <a:p>
             <a:pPr marL="285750" indent="-285750">
@@ -4523,12 +4172,14 @@
               <a:rPr lang="en-IN" dirty="0"/>
               <a:t>An online portal generated shall require IE v9 or higher, Google Chrome, Mozilla Firefox, or any other web browser.</a:t>
             </a:r>
+            <a:endParaRPr lang="en-IN" dirty="0"/>
           </a:p>
           <a:p>
             <a:r>
               <a:rPr lang="en-IN" dirty="0"/>
               <a:t> </a:t>
             </a:r>
+            <a:endParaRPr lang="en-IN" dirty="0"/>
           </a:p>
           <a:p>
             <a:r>
@@ -4550,6 +4201,7 @@
               <a:rPr lang="en-IN" dirty="0"/>
               <a:t>A percentage of farmers do not have access to smartphone, therefore SMS/Call System has been made available.</a:t>
             </a:r>
+            <a:endParaRPr lang="en-IN" dirty="0"/>
           </a:p>
           <a:p>
             <a:pPr marL="285750" indent="-285750">
@@ -4560,6 +4212,7 @@
               <a:rPr lang="en-IN" dirty="0"/>
               <a:t>Farmer profits increases owing to the fact that farmers sell their products at better rates, eliminating the middleman.</a:t>
             </a:r>
+            <a:endParaRPr lang="en-IN" dirty="0"/>
           </a:p>
           <a:p>
             <a:pPr marL="285750" indent="-285750">
@@ -4570,6 +4223,7 @@
               <a:rPr lang="en-IN" dirty="0"/>
               <a:t>Buyers can get their hands directly on fresh products according to their choice of product, variety and time, straight from the fields in reasonable prices from all over India.</a:t>
             </a:r>
+            <a:endParaRPr lang="en-IN" dirty="0"/>
           </a:p>
           <a:p>
             <a:pPr marL="285750" indent="-285750">
@@ -4580,6 +4234,7 @@
               <a:rPr lang="en-IN" dirty="0"/>
               <a:t>Multiple farmers (many of which reside in remote areas) get in direct touch with buyers in capital cities and the prices are negotiable between them with no involvement of the admin whatsoever.</a:t>
             </a:r>
+            <a:endParaRPr lang="en-IN" dirty="0"/>
           </a:p>
           <a:p>
             <a:pPr marL="285750" indent="-285750">
@@ -4590,6 +4245,7 @@
               <a:rPr lang="en-IN" dirty="0"/>
               <a:t>The farmer does not have to spend any extra cost in delivery and marketing.</a:t>
             </a:r>
+            <a:endParaRPr lang="en-IN" dirty="0"/>
           </a:p>
           <a:p>
             <a:pPr marL="285750" indent="-285750">
@@ -4605,32 +4261,21 @@
       </p:sp>
       <p:pic>
         <p:nvPicPr>
-          <p:cNvPr id="13" name="Picture 12">
-            <a:extLst>
-              <a:ext uri="{FF2B5EF4-FFF2-40B4-BE49-F238E27FC236}">
-                <a16:creationId xmlns:a16="http://schemas.microsoft.com/office/drawing/2014/main" id="{61193CB5-8D30-45CD-B25D-2581B1D1DC85}"/>
-              </a:ext>
-            </a:extLst>
-          </p:cNvPr>
+          <p:cNvPr id="13" name="Picture 12" descr="C:\xampp\htdocs\AgroCraft-PHP\Documents\Use Case.pngUse Case"/>
           <p:cNvPicPr/>
           <p:nvPr/>
         </p:nvPicPr>
         <p:blipFill>
-          <a:blip r:embed="rId2" cstate="print">
-            <a:extLst>
-              <a:ext uri="{28A0092B-C50C-407E-A947-70E740481C1C}">
-                <a14:useLocalDpi xmlns:a14="http://schemas.microsoft.com/office/drawing/2010/main" val="0"/>
-              </a:ext>
-            </a:extLst>
-          </a:blip>
+          <a:blip r:embed="rId1"/>
+          <a:srcRect l="275" t="1222" r="-725"/>
           <a:stretch>
             <a:fillRect/>
           </a:stretch>
         </p:blipFill>
         <p:spPr>
           <a:xfrm>
-            <a:off x="6743700" y="1285875"/>
-            <a:ext cx="5102224" cy="4781550"/>
+            <a:off x="6335395" y="1204595"/>
+            <a:ext cx="5697855" cy="4862830"/>
           </a:xfrm>
           <a:prstGeom prst="rect">
             <a:avLst/>
@@ -4639,13 +4284,7 @@
       </p:pic>
       <p:sp>
         <p:nvSpPr>
-          <p:cNvPr id="14" name="TextBox 13">
-            <a:extLst>
-              <a:ext uri="{FF2B5EF4-FFF2-40B4-BE49-F238E27FC236}">
-                <a16:creationId xmlns:a16="http://schemas.microsoft.com/office/drawing/2014/main" id="{EE57A971-6DE8-4423-A230-701BCC14700D}"/>
-              </a:ext>
-            </a:extLst>
-          </p:cNvPr>
+          <p:cNvPr id="14" name="TextBox 13"/>
           <p:cNvSpPr txBox="1"/>
           <p:nvPr/>
         </p:nvSpPr>
@@ -4674,15 +4313,11 @@
               <a:rPr lang="en-IN" dirty="0"/>
               <a:t>:-</a:t>
             </a:r>
+            <a:endParaRPr lang="en-IN" dirty="0"/>
           </a:p>
         </p:txBody>
       </p:sp>
     </p:spTree>
-    <p:extLst>
-      <p:ext uri="{BB962C8B-B14F-4D97-AF65-F5344CB8AC3E}">
-        <p14:creationId xmlns:p14="http://schemas.microsoft.com/office/powerpoint/2010/main" val="2758939497"/>
-      </p:ext>
-    </p:extLst>
   </p:cSld>
   <p:clrMapOvr>
     <a:masterClrMapping/>
@@ -4733,7 +4368,7 @@
     </a:clrScheme>
     <a:fontScheme name="Office">
       <a:majorFont>
-        <a:latin typeface="Calibri Light" panose="020F0302020204030204"/>
+        <a:latin typeface="Calibri Light"/>
         <a:ea typeface=""/>
         <a:cs typeface=""/>
         <a:font script="Jpan" typeface="游ゴシック Light"/>
@@ -4766,26 +4401,9 @@
         <a:font script="Viet" typeface="Times New Roman"/>
         <a:font script="Uigh" typeface="Microsoft Uighur"/>
         <a:font script="Geor" typeface="Sylfaen"/>
-        <a:font script="Armn" typeface="Arial"/>
-        <a:font script="Bugi" typeface="Leelawadee UI"/>
-        <a:font script="Bopo" typeface="Microsoft JhengHei"/>
-        <a:font script="Java" typeface="Javanese Text"/>
-        <a:font script="Lisu" typeface="Segoe UI"/>
-        <a:font script="Mymr" typeface="Myanmar Text"/>
-        <a:font script="Nkoo" typeface="Ebrima"/>
-        <a:font script="Olck" typeface="Nirmala UI"/>
-        <a:font script="Osma" typeface="Ebrima"/>
-        <a:font script="Phag" typeface="Phagspa"/>
-        <a:font script="Syrn" typeface="Estrangelo Edessa"/>
-        <a:font script="Syrj" typeface="Estrangelo Edessa"/>
-        <a:font script="Syre" typeface="Estrangelo Edessa"/>
-        <a:font script="Sora" typeface="Nirmala UI"/>
-        <a:font script="Tale" typeface="Microsoft Tai Le"/>
-        <a:font script="Talu" typeface="Microsoft New Tai Lue"/>
-        <a:font script="Tfng" typeface="Ebrima"/>
       </a:majorFont>
       <a:minorFont>
-        <a:latin typeface="Calibri" panose="020F0502020204030204"/>
+        <a:latin typeface="Calibri"/>
         <a:ea typeface=""/>
         <a:cs typeface=""/>
         <a:font script="Jpan" typeface="游ゴシック"/>
@@ -4818,23 +4436,6 @@
         <a:font script="Viet" typeface="Arial"/>
         <a:font script="Uigh" typeface="Microsoft Uighur"/>
         <a:font script="Geor" typeface="Sylfaen"/>
-        <a:font script="Armn" typeface="Arial"/>
-        <a:font script="Bugi" typeface="Leelawadee UI"/>
-        <a:font script="Bopo" typeface="Microsoft JhengHei"/>
-        <a:font script="Java" typeface="Javanese Text"/>
-        <a:font script="Lisu" typeface="Segoe UI"/>
-        <a:font script="Mymr" typeface="Myanmar Text"/>
-        <a:font script="Nkoo" typeface="Ebrima"/>
-        <a:font script="Olck" typeface="Nirmala UI"/>
-        <a:font script="Osma" typeface="Ebrima"/>
-        <a:font script="Phag" typeface="Phagspa"/>
-        <a:font script="Syrn" typeface="Estrangelo Edessa"/>
-        <a:font script="Syrj" typeface="Estrangelo Edessa"/>
-        <a:font script="Syre" typeface="Estrangelo Edessa"/>
-        <a:font script="Sora" typeface="Nirmala UI"/>
-        <a:font script="Tale" typeface="Microsoft Tai Le"/>
-        <a:font script="Talu" typeface="Microsoft New Tai Lue"/>
-        <a:font script="Tfng" typeface="Ebrima"/>
       </a:minorFont>
     </a:fontScheme>
     <a:fmtScheme name="Office">
@@ -4975,8 +4576,6 @@
       </a:bgFillStyleLst>
     </a:fmtScheme>
   </a:themeElements>
-  <a:objectDefaults/>
-  <a:extraClrSchemeLst/>
   <a:extLst>
     <a:ext uri="{05A4C25C-085E-4340-85A3-A5531E510DB2}">
       <thm15:themeFamily xmlns:thm15="http://schemas.microsoft.com/office/thememl/2012/main" name="Office Theme" id="{62F939B6-93AF-4DB8-9C6B-D6C7DFDC589F}" vid="{4A3C46E8-61CC-4603-A589-7422A47A8E4A}"/>
@@ -5028,7 +4627,7 @@
     </a:clrScheme>
     <a:fontScheme name="Office">
       <a:majorFont>
-        <a:latin typeface="Calibri Light" panose="020F0302020204030204"/>
+        <a:latin typeface="Calibri Light"/>
         <a:ea typeface=""/>
         <a:cs typeface=""/>
         <a:font script="Jpan" typeface="游ゴシック Light"/>
@@ -5061,26 +4660,9 @@
         <a:font script="Viet" typeface="Times New Roman"/>
         <a:font script="Uigh" typeface="Microsoft Uighur"/>
         <a:font script="Geor" typeface="Sylfaen"/>
-        <a:font script="Armn" typeface="Arial"/>
-        <a:font script="Bugi" typeface="Leelawadee UI"/>
-        <a:font script="Bopo" typeface="Microsoft JhengHei"/>
-        <a:font script="Java" typeface="Javanese Text"/>
-        <a:font script="Lisu" typeface="Segoe UI"/>
-        <a:font script="Mymr" typeface="Myanmar Text"/>
-        <a:font script="Nkoo" typeface="Ebrima"/>
-        <a:font script="Olck" typeface="Nirmala UI"/>
-        <a:font script="Osma" typeface="Ebrima"/>
-        <a:font script="Phag" typeface="Phagspa"/>
-        <a:font script="Syrn" typeface="Estrangelo Edessa"/>
-        <a:font script="Syrj" typeface="Estrangelo Edessa"/>
-        <a:font script="Syre" typeface="Estrangelo Edessa"/>
-        <a:font script="Sora" typeface="Nirmala UI"/>
-        <a:font script="Tale" typeface="Microsoft Tai Le"/>
-        <a:font script="Talu" typeface="Microsoft New Tai Lue"/>
-        <a:font script="Tfng" typeface="Ebrima"/>
       </a:majorFont>
       <a:minorFont>
-        <a:latin typeface="Calibri" panose="020F0502020204030204"/>
+        <a:latin typeface="Calibri"/>
         <a:ea typeface=""/>
         <a:cs typeface=""/>
         <a:font script="Jpan" typeface="游ゴシック"/>
@@ -5113,23 +4695,6 @@
         <a:font script="Viet" typeface="Arial"/>
         <a:font script="Uigh" typeface="Microsoft Uighur"/>
         <a:font script="Geor" typeface="Sylfaen"/>
-        <a:font script="Armn" typeface="Arial"/>
-        <a:font script="Bugi" typeface="Leelawadee UI"/>
-        <a:font script="Bopo" typeface="Microsoft JhengHei"/>
-        <a:font script="Java" typeface="Javanese Text"/>
-        <a:font script="Lisu" typeface="Segoe UI"/>
-        <a:font script="Mymr" typeface="Myanmar Text"/>
-        <a:font script="Nkoo" typeface="Ebrima"/>
-        <a:font script="Olck" typeface="Nirmala UI"/>
-        <a:font script="Osma" typeface="Ebrima"/>
-        <a:font script="Phag" typeface="Phagspa"/>
-        <a:font script="Syrn" typeface="Estrangelo Edessa"/>
-        <a:font script="Syrj" typeface="Estrangelo Edessa"/>
-        <a:font script="Syre" typeface="Estrangelo Edessa"/>
-        <a:font script="Sora" typeface="Nirmala UI"/>
-        <a:font script="Tale" typeface="Microsoft Tai Le"/>
-        <a:font script="Talu" typeface="Microsoft New Tai Lue"/>
-        <a:font script="Tfng" typeface="Ebrima"/>
       </a:minorFont>
     </a:fontScheme>
     <a:fmtScheme name="Office">
@@ -5270,8 +4835,6 @@
       </a:bgFillStyleLst>
     </a:fmtScheme>
   </a:themeElements>
-  <a:objectDefaults/>
-  <a:extraClrSchemeLst/>
   <a:extLst>
     <a:ext uri="{05A4C25C-085E-4340-85A3-A5531E510DB2}">
       <thm15:themeFamily xmlns:thm15="http://schemas.microsoft.com/office/thememl/2012/main" name="Office Theme" id="{62F939B6-93AF-4DB8-9C6B-D6C7DFDC589F}" vid="{4A3C46E8-61CC-4603-A589-7422A47A8E4A}"/>

</xml_diff>

<commit_message>
Final Pdf and use case done
</commit_message>
<xml_diff>
--- a/Documents/AgroCraft.pptx
+++ b/Documents/AgroCraft.pptx
@@ -8,11 +8,11 @@
     <p:notesMasterId r:id="rId7"/>
   </p:notesMasterIdLst>
   <p:sldIdLst>
-    <p:sldId id="260" r:id="rId3"/>
-    <p:sldId id="261" r:id="rId4"/>
-    <p:sldId id="262" r:id="rId5"/>
-    <p:sldId id="258" r:id="rId6"/>
-    <p:sldId id="259" r:id="rId8"/>
+    <p:sldId id="260" r:id="rId2"/>
+    <p:sldId id="261" r:id="rId3"/>
+    <p:sldId id="262" r:id="rId4"/>
+    <p:sldId id="258" r:id="rId5"/>
+    <p:sldId id="259" r:id="rId6"/>
   </p:sldIdLst>
   <p:sldSz cx="12192000" cy="6858000"/>
   <p:notesSz cx="6858000" cy="9144000"/>
@@ -111,6 +111,22 @@
       </a:defRPr>
     </a:lvl9pPr>
   </p:defaultTextStyle>
+  <p:extLst>
+    <p:ext uri="{EFAFB233-063F-42B5-8137-9DF3F51BA10A}">
+      <p15:sldGuideLst xmlns:p15="http://schemas.microsoft.com/office/powerpoint/2012/main">
+        <p15:guide id="1" orient="horz" pos="2206">
+          <p15:clr>
+            <a:srgbClr val="A4A3A4"/>
+          </p15:clr>
+        </p15:guide>
+        <p15:guide id="2" pos="3839">
+          <p15:clr>
+            <a:srgbClr val="A4A3A4"/>
+          </p15:clr>
+        </p15:guide>
+      </p15:sldGuideLst>
+    </p:ext>
+  </p:extLst>
 </p:presentation>
 </file>
 
@@ -196,6 +212,7 @@
           <a:p>
             <a:fld id="{3EFD42F7-718C-4B98-AAEC-167E6DDD60A7}" type="datetimeFigureOut">
               <a:rPr lang="en-US" smtClean="0"/>
+              <a:t>2/7/2020</a:t>
             </a:fld>
             <a:endParaRPr lang="en-US"/>
           </a:p>
@@ -262,7 +279,6 @@
               <a:rPr lang="en-US" smtClean="0"/>
               <a:t>Click to edit Master text styles</a:t>
             </a:r>
-            <a:endParaRPr lang="en-US" smtClean="0"/>
           </a:p>
           <a:p>
             <a:pPr lvl="1"/>
@@ -270,7 +286,6 @@
               <a:rPr lang="en-US" smtClean="0"/>
               <a:t>Second level</a:t>
             </a:r>
-            <a:endParaRPr lang="en-US" smtClean="0"/>
           </a:p>
           <a:p>
             <a:pPr lvl="2"/>
@@ -278,7 +293,6 @@
               <a:rPr lang="en-US" smtClean="0"/>
               <a:t>Third level</a:t>
             </a:r>
-            <a:endParaRPr lang="en-US" smtClean="0"/>
           </a:p>
           <a:p>
             <a:pPr lvl="3"/>
@@ -286,7 +300,6 @@
               <a:rPr lang="en-US" smtClean="0"/>
               <a:t>Fourth level</a:t>
             </a:r>
-            <a:endParaRPr lang="en-US" smtClean="0"/>
           </a:p>
           <a:p>
             <a:pPr lvl="4"/>
@@ -358,6 +371,7 @@
           <a:p>
             <a:fld id="{21B2AA4F-B828-4D7C-AFD3-893933DAFCB4}" type="slidenum">
               <a:rPr lang="en-US" smtClean="0"/>
+              <a:t>‹#›</a:t>
             </a:fld>
             <a:endParaRPr lang="en-US"/>
           </a:p>
@@ -704,6 +718,7 @@
           <a:p>
             <a:fld id="{F613E53F-5DD9-4429-8128-EA2492E7B99D}" type="datetimeFigureOut">
               <a:rPr lang="en-IN" smtClean="0"/>
+              <a:t>07-02-2020</a:t>
             </a:fld>
             <a:endParaRPr lang="en-IN"/>
           </a:p>
@@ -745,6 +760,7 @@
           <a:p>
             <a:fld id="{9A1E4711-60B3-4FAF-9C2A-54CAF9E6D181}" type="slidenum">
               <a:rPr lang="en-IN" smtClean="0"/>
+              <a:t>‹#›</a:t>
             </a:fld>
             <a:endParaRPr lang="en-IN"/>
           </a:p>
@@ -818,7 +834,6 @@
               <a:rPr lang="en-US"/>
               <a:t>Click to edit Master text styles</a:t>
             </a:r>
-            <a:endParaRPr lang="en-US"/>
           </a:p>
           <a:p>
             <a:pPr lvl="1"/>
@@ -826,7 +841,6 @@
               <a:rPr lang="en-US"/>
               <a:t>Second level</a:t>
             </a:r>
-            <a:endParaRPr lang="en-US"/>
           </a:p>
           <a:p>
             <a:pPr lvl="2"/>
@@ -834,7 +848,6 @@
               <a:rPr lang="en-US"/>
               <a:t>Third level</a:t>
             </a:r>
-            <a:endParaRPr lang="en-US"/>
           </a:p>
           <a:p>
             <a:pPr lvl="3"/>
@@ -842,7 +855,6 @@
               <a:rPr lang="en-US"/>
               <a:t>Fourth level</a:t>
             </a:r>
-            <a:endParaRPr lang="en-US"/>
           </a:p>
           <a:p>
             <a:pPr lvl="4"/>
@@ -871,6 +883,7 @@
           <a:p>
             <a:fld id="{F613E53F-5DD9-4429-8128-EA2492E7B99D}" type="datetimeFigureOut">
               <a:rPr lang="en-IN" smtClean="0"/>
+              <a:t>07-02-2020</a:t>
             </a:fld>
             <a:endParaRPr lang="en-IN"/>
           </a:p>
@@ -912,6 +925,7 @@
           <a:p>
             <a:fld id="{9A1E4711-60B3-4FAF-9C2A-54CAF9E6D181}" type="slidenum">
               <a:rPr lang="en-IN" smtClean="0"/>
+              <a:t>‹#›</a:t>
             </a:fld>
             <a:endParaRPr lang="en-IN"/>
           </a:p>
@@ -995,7 +1009,6 @@
               <a:rPr lang="en-US"/>
               <a:t>Click to edit Master text styles</a:t>
             </a:r>
-            <a:endParaRPr lang="en-US"/>
           </a:p>
           <a:p>
             <a:pPr lvl="1"/>
@@ -1003,7 +1016,6 @@
               <a:rPr lang="en-US"/>
               <a:t>Second level</a:t>
             </a:r>
-            <a:endParaRPr lang="en-US"/>
           </a:p>
           <a:p>
             <a:pPr lvl="2"/>
@@ -1011,7 +1023,6 @@
               <a:rPr lang="en-US"/>
               <a:t>Third level</a:t>
             </a:r>
-            <a:endParaRPr lang="en-US"/>
           </a:p>
           <a:p>
             <a:pPr lvl="3"/>
@@ -1019,7 +1030,6 @@
               <a:rPr lang="en-US"/>
               <a:t>Fourth level</a:t>
             </a:r>
-            <a:endParaRPr lang="en-US"/>
           </a:p>
           <a:p>
             <a:pPr lvl="4"/>
@@ -1048,6 +1058,7 @@
           <a:p>
             <a:fld id="{F613E53F-5DD9-4429-8128-EA2492E7B99D}" type="datetimeFigureOut">
               <a:rPr lang="en-IN" smtClean="0"/>
+              <a:t>07-02-2020</a:t>
             </a:fld>
             <a:endParaRPr lang="en-IN"/>
           </a:p>
@@ -1089,6 +1100,7 @@
           <a:p>
             <a:fld id="{9A1E4711-60B3-4FAF-9C2A-54CAF9E6D181}" type="slidenum">
               <a:rPr lang="en-IN" smtClean="0"/>
+              <a:t>‹#›</a:t>
             </a:fld>
             <a:endParaRPr lang="en-IN"/>
           </a:p>
@@ -1162,7 +1174,6 @@
               <a:rPr lang="en-US"/>
               <a:t>Click to edit Master text styles</a:t>
             </a:r>
-            <a:endParaRPr lang="en-US"/>
           </a:p>
           <a:p>
             <a:pPr lvl="1"/>
@@ -1170,7 +1181,6 @@
               <a:rPr lang="en-US"/>
               <a:t>Second level</a:t>
             </a:r>
-            <a:endParaRPr lang="en-US"/>
           </a:p>
           <a:p>
             <a:pPr lvl="2"/>
@@ -1178,7 +1188,6 @@
               <a:rPr lang="en-US"/>
               <a:t>Third level</a:t>
             </a:r>
-            <a:endParaRPr lang="en-US"/>
           </a:p>
           <a:p>
             <a:pPr lvl="3"/>
@@ -1186,7 +1195,6 @@
               <a:rPr lang="en-US"/>
               <a:t>Fourth level</a:t>
             </a:r>
-            <a:endParaRPr lang="en-US"/>
           </a:p>
           <a:p>
             <a:pPr lvl="4"/>
@@ -1215,6 +1223,7 @@
           <a:p>
             <a:fld id="{F613E53F-5DD9-4429-8128-EA2492E7B99D}" type="datetimeFigureOut">
               <a:rPr lang="en-IN" smtClean="0"/>
+              <a:t>07-02-2020</a:t>
             </a:fld>
             <a:endParaRPr lang="en-IN"/>
           </a:p>
@@ -1256,6 +1265,7 @@
           <a:p>
             <a:fld id="{9A1E4711-60B3-4FAF-9C2A-54CAF9E6D181}" type="slidenum">
               <a:rPr lang="en-IN" smtClean="0"/>
+              <a:t>‹#›</a:t>
             </a:fld>
             <a:endParaRPr lang="en-IN"/>
           </a:p>
@@ -1434,7 +1444,6 @@
               <a:rPr lang="en-US"/>
               <a:t>Click to edit Master text styles</a:t>
             </a:r>
-            <a:endParaRPr lang="en-US"/>
           </a:p>
         </p:txBody>
       </p:sp>
@@ -1455,6 +1464,7 @@
           <a:p>
             <a:fld id="{F613E53F-5DD9-4429-8128-EA2492E7B99D}" type="datetimeFigureOut">
               <a:rPr lang="en-IN" smtClean="0"/>
+              <a:t>07-02-2020</a:t>
             </a:fld>
             <a:endParaRPr lang="en-IN"/>
           </a:p>
@@ -1496,6 +1506,7 @@
           <a:p>
             <a:fld id="{9A1E4711-60B3-4FAF-9C2A-54CAF9E6D181}" type="slidenum">
               <a:rPr lang="en-IN" smtClean="0"/>
+              <a:t>‹#›</a:t>
             </a:fld>
             <a:endParaRPr lang="en-IN"/>
           </a:p>
@@ -1574,7 +1585,6 @@
               <a:rPr lang="en-US"/>
               <a:t>Click to edit Master text styles</a:t>
             </a:r>
-            <a:endParaRPr lang="en-US"/>
           </a:p>
           <a:p>
             <a:pPr lvl="1"/>
@@ -1582,7 +1592,6 @@
               <a:rPr lang="en-US"/>
               <a:t>Second level</a:t>
             </a:r>
-            <a:endParaRPr lang="en-US"/>
           </a:p>
           <a:p>
             <a:pPr lvl="2"/>
@@ -1590,7 +1599,6 @@
               <a:rPr lang="en-US"/>
               <a:t>Third level</a:t>
             </a:r>
-            <a:endParaRPr lang="en-US"/>
           </a:p>
           <a:p>
             <a:pPr lvl="3"/>
@@ -1598,7 +1606,6 @@
               <a:rPr lang="en-US"/>
               <a:t>Fourth level</a:t>
             </a:r>
-            <a:endParaRPr lang="en-US"/>
           </a:p>
           <a:p>
             <a:pPr lvl="4"/>
@@ -1635,7 +1642,6 @@
               <a:rPr lang="en-US"/>
               <a:t>Click to edit Master text styles</a:t>
             </a:r>
-            <a:endParaRPr lang="en-US"/>
           </a:p>
           <a:p>
             <a:pPr lvl="1"/>
@@ -1643,7 +1649,6 @@
               <a:rPr lang="en-US"/>
               <a:t>Second level</a:t>
             </a:r>
-            <a:endParaRPr lang="en-US"/>
           </a:p>
           <a:p>
             <a:pPr lvl="2"/>
@@ -1651,7 +1656,6 @@
               <a:rPr lang="en-US"/>
               <a:t>Third level</a:t>
             </a:r>
-            <a:endParaRPr lang="en-US"/>
           </a:p>
           <a:p>
             <a:pPr lvl="3"/>
@@ -1659,7 +1663,6 @@
               <a:rPr lang="en-US"/>
               <a:t>Fourth level</a:t>
             </a:r>
-            <a:endParaRPr lang="en-US"/>
           </a:p>
           <a:p>
             <a:pPr lvl="4"/>
@@ -1688,6 +1691,7 @@
           <a:p>
             <a:fld id="{F613E53F-5DD9-4429-8128-EA2492E7B99D}" type="datetimeFigureOut">
               <a:rPr lang="en-IN" smtClean="0"/>
+              <a:t>07-02-2020</a:t>
             </a:fld>
             <a:endParaRPr lang="en-IN"/>
           </a:p>
@@ -1729,6 +1733,7 @@
           <a:p>
             <a:fld id="{9A1E4711-60B3-4FAF-9C2A-54CAF9E6D181}" type="slidenum">
               <a:rPr lang="en-IN" smtClean="0"/>
+              <a:t>‹#›</a:t>
             </a:fld>
             <a:endParaRPr lang="en-IN"/>
           </a:p>
@@ -1849,7 +1854,6 @@
               <a:rPr lang="en-US"/>
               <a:t>Click to edit Master text styles</a:t>
             </a:r>
-            <a:endParaRPr lang="en-US"/>
           </a:p>
         </p:txBody>
       </p:sp>
@@ -1878,7 +1882,6 @@
               <a:rPr lang="en-US"/>
               <a:t>Click to edit Master text styles</a:t>
             </a:r>
-            <a:endParaRPr lang="en-US"/>
           </a:p>
           <a:p>
             <a:pPr lvl="1"/>
@@ -1886,7 +1889,6 @@
               <a:rPr lang="en-US"/>
               <a:t>Second level</a:t>
             </a:r>
-            <a:endParaRPr lang="en-US"/>
           </a:p>
           <a:p>
             <a:pPr lvl="2"/>
@@ -1894,7 +1896,6 @@
               <a:rPr lang="en-US"/>
               <a:t>Third level</a:t>
             </a:r>
-            <a:endParaRPr lang="en-US"/>
           </a:p>
           <a:p>
             <a:pPr lvl="3"/>
@@ -1902,7 +1903,6 @@
               <a:rPr lang="en-US"/>
               <a:t>Fourth level</a:t>
             </a:r>
-            <a:endParaRPr lang="en-US"/>
           </a:p>
           <a:p>
             <a:pPr lvl="4"/>
@@ -1976,7 +1976,6 @@
               <a:rPr lang="en-US"/>
               <a:t>Click to edit Master text styles</a:t>
             </a:r>
-            <a:endParaRPr lang="en-US"/>
           </a:p>
         </p:txBody>
       </p:sp>
@@ -2005,7 +2004,6 @@
               <a:rPr lang="en-US"/>
               <a:t>Click to edit Master text styles</a:t>
             </a:r>
-            <a:endParaRPr lang="en-US"/>
           </a:p>
           <a:p>
             <a:pPr lvl="1"/>
@@ -2013,7 +2011,6 @@
               <a:rPr lang="en-US"/>
               <a:t>Second level</a:t>
             </a:r>
-            <a:endParaRPr lang="en-US"/>
           </a:p>
           <a:p>
             <a:pPr lvl="2"/>
@@ -2021,7 +2018,6 @@
               <a:rPr lang="en-US"/>
               <a:t>Third level</a:t>
             </a:r>
-            <a:endParaRPr lang="en-US"/>
           </a:p>
           <a:p>
             <a:pPr lvl="3"/>
@@ -2029,7 +2025,6 @@
               <a:rPr lang="en-US"/>
               <a:t>Fourth level</a:t>
             </a:r>
-            <a:endParaRPr lang="en-US"/>
           </a:p>
           <a:p>
             <a:pPr lvl="4"/>
@@ -2058,6 +2053,7 @@
           <a:p>
             <a:fld id="{F613E53F-5DD9-4429-8128-EA2492E7B99D}" type="datetimeFigureOut">
               <a:rPr lang="en-IN" smtClean="0"/>
+              <a:t>07-02-2020</a:t>
             </a:fld>
             <a:endParaRPr lang="en-IN"/>
           </a:p>
@@ -2099,6 +2095,7 @@
           <a:p>
             <a:fld id="{9A1E4711-60B3-4FAF-9C2A-54CAF9E6D181}" type="slidenum">
               <a:rPr lang="en-IN" smtClean="0"/>
+              <a:t>‹#›</a:t>
             </a:fld>
             <a:endParaRPr lang="en-IN"/>
           </a:p>
@@ -2169,6 +2166,7 @@
           <a:p>
             <a:fld id="{F613E53F-5DD9-4429-8128-EA2492E7B99D}" type="datetimeFigureOut">
               <a:rPr lang="en-IN" smtClean="0"/>
+              <a:t>07-02-2020</a:t>
             </a:fld>
             <a:endParaRPr lang="en-IN"/>
           </a:p>
@@ -2210,6 +2208,7 @@
           <a:p>
             <a:fld id="{9A1E4711-60B3-4FAF-9C2A-54CAF9E6D181}" type="slidenum">
               <a:rPr lang="en-IN" smtClean="0"/>
+              <a:t>‹#›</a:t>
             </a:fld>
             <a:endParaRPr lang="en-IN"/>
           </a:p>
@@ -2257,6 +2256,7 @@
           <a:p>
             <a:fld id="{F613E53F-5DD9-4429-8128-EA2492E7B99D}" type="datetimeFigureOut">
               <a:rPr lang="en-IN" smtClean="0"/>
+              <a:t>07-02-2020</a:t>
             </a:fld>
             <a:endParaRPr lang="en-IN"/>
           </a:p>
@@ -2298,6 +2298,7 @@
           <a:p>
             <a:fld id="{9A1E4711-60B3-4FAF-9C2A-54CAF9E6D181}" type="slidenum">
               <a:rPr lang="en-IN" smtClean="0"/>
+              <a:t>‹#›</a:t>
             </a:fld>
             <a:endParaRPr lang="en-IN"/>
           </a:p>
@@ -2413,7 +2414,6 @@
               <a:rPr lang="en-US"/>
               <a:t>Click to edit Master text styles</a:t>
             </a:r>
-            <a:endParaRPr lang="en-US"/>
           </a:p>
           <a:p>
             <a:pPr lvl="1"/>
@@ -2421,7 +2421,6 @@
               <a:rPr lang="en-US"/>
               <a:t>Second level</a:t>
             </a:r>
-            <a:endParaRPr lang="en-US"/>
           </a:p>
           <a:p>
             <a:pPr lvl="2"/>
@@ -2429,7 +2428,6 @@
               <a:rPr lang="en-US"/>
               <a:t>Third level</a:t>
             </a:r>
-            <a:endParaRPr lang="en-US"/>
           </a:p>
           <a:p>
             <a:pPr lvl="3"/>
@@ -2437,7 +2435,6 @@
               <a:rPr lang="en-US"/>
               <a:t>Fourth level</a:t>
             </a:r>
-            <a:endParaRPr lang="en-US"/>
           </a:p>
           <a:p>
             <a:pPr lvl="4"/>
@@ -2511,7 +2508,6 @@
               <a:rPr lang="en-US"/>
               <a:t>Click to edit Master text styles</a:t>
             </a:r>
-            <a:endParaRPr lang="en-US"/>
           </a:p>
         </p:txBody>
       </p:sp>
@@ -2532,6 +2528,7 @@
           <a:p>
             <a:fld id="{F613E53F-5DD9-4429-8128-EA2492E7B99D}" type="datetimeFigureOut">
               <a:rPr lang="en-IN" smtClean="0"/>
+              <a:t>07-02-2020</a:t>
             </a:fld>
             <a:endParaRPr lang="en-IN"/>
           </a:p>
@@ -2573,6 +2570,7 @@
           <a:p>
             <a:fld id="{9A1E4711-60B3-4FAF-9C2A-54CAF9E6D181}" type="slidenum">
               <a:rPr lang="en-IN" smtClean="0"/>
+              <a:t>‹#›</a:t>
             </a:fld>
             <a:endParaRPr lang="en-IN"/>
           </a:p>
@@ -2758,7 +2756,6 @@
               <a:rPr lang="en-US"/>
               <a:t>Click to edit Master text styles</a:t>
             </a:r>
-            <a:endParaRPr lang="en-US"/>
           </a:p>
         </p:txBody>
       </p:sp>
@@ -2779,6 +2776,7 @@
           <a:p>
             <a:fld id="{F613E53F-5DD9-4429-8128-EA2492E7B99D}" type="datetimeFigureOut">
               <a:rPr lang="en-IN" smtClean="0"/>
+              <a:t>07-02-2020</a:t>
             </a:fld>
             <a:endParaRPr lang="en-IN"/>
           </a:p>
@@ -2820,6 +2818,7 @@
           <a:p>
             <a:fld id="{9A1E4711-60B3-4FAF-9C2A-54CAF9E6D181}" type="slidenum">
               <a:rPr lang="en-IN" smtClean="0"/>
+              <a:t>‹#›</a:t>
             </a:fld>
             <a:endParaRPr lang="en-IN"/>
           </a:p>
@@ -2918,7 +2917,6 @@
               <a:rPr lang="en-US"/>
               <a:t>Click to edit Master text styles</a:t>
             </a:r>
-            <a:endParaRPr lang="en-US"/>
           </a:p>
           <a:p>
             <a:pPr lvl="1"/>
@@ -2926,7 +2924,6 @@
               <a:rPr lang="en-US"/>
               <a:t>Second level</a:t>
             </a:r>
-            <a:endParaRPr lang="en-US"/>
           </a:p>
           <a:p>
             <a:pPr lvl="2"/>
@@ -2934,7 +2931,6 @@
               <a:rPr lang="en-US"/>
               <a:t>Third level</a:t>
             </a:r>
-            <a:endParaRPr lang="en-US"/>
           </a:p>
           <a:p>
             <a:pPr lvl="3"/>
@@ -2942,7 +2938,6 @@
               <a:rPr lang="en-US"/>
               <a:t>Fourth level</a:t>
             </a:r>
-            <a:endParaRPr lang="en-US"/>
           </a:p>
           <a:p>
             <a:pPr lvl="4"/>
@@ -2989,6 +2984,7 @@
           <a:p>
             <a:fld id="{F613E53F-5DD9-4429-8128-EA2492E7B99D}" type="datetimeFigureOut">
               <a:rPr lang="en-IN" smtClean="0"/>
+              <a:t>07-02-2020</a:t>
             </a:fld>
             <a:endParaRPr lang="en-IN"/>
           </a:p>
@@ -3066,6 +3062,7 @@
           <a:p>
             <a:fld id="{9A1E4711-60B3-4FAF-9C2A-54CAF9E6D181}" type="slidenum">
               <a:rPr lang="en-IN" smtClean="0"/>
+              <a:t>‹#›</a:t>
             </a:fld>
             <a:endParaRPr lang="en-IN"/>
           </a:p>
@@ -3645,7 +3642,13 @@
               <a:rPr lang="en-IN" sz="2000" dirty="0">
                 <a:sym typeface="+mn-ea"/>
               </a:rPr>
-              <a:t>to upload product details and respond via phone and SMS .</a:t>
+              <a:t>to upload product details and respond via phone and </a:t>
+            </a:r>
+            <a:r>
+              <a:rPr lang="en-IN" sz="2000" dirty="0" smtClean="0">
+                <a:sym typeface="+mn-ea"/>
+              </a:rPr>
+              <a:t>SMS.</a:t>
             </a:r>
             <a:endParaRPr lang="en-IN" sz="2000" dirty="0">
               <a:effectLst/>
@@ -3751,9 +3754,6 @@
               </a:rPr>
               <a:t>: RA27   </a:t>
             </a:r>
-            <a:endParaRPr lang="en-IN" sz="2000" dirty="0">
-              <a:sym typeface="+mn-ea"/>
-            </a:endParaRPr>
           </a:p>
           <a:p>
             <a:pPr marL="0" indent="0" algn="l">
@@ -3802,9 +3802,6 @@
               </a:rPr>
               <a:t> Abhishek Gupta 	</a:t>
             </a:r>
-            <a:endParaRPr lang="en-IN" sz="2000" dirty="0">
-              <a:sym typeface="+mn-ea"/>
-            </a:endParaRPr>
           </a:p>
           <a:p>
             <a:pPr marL="0" indent="0" algn="l">
@@ -3842,13 +3839,13 @@
               <a:t>COLLEGE CODE </a:t>
             </a:r>
             <a:r>
-              <a:rPr lang="en-IN" sz="2000" b="1" u="sng" dirty="0">
+              <a:rPr lang="en-IN" sz="2000" b="1" u="sng" dirty="0" smtClean="0">
                 <a:sym typeface="+mn-ea"/>
               </a:rPr>
               <a:t>:</a:t>
             </a:r>
             <a:r>
-              <a:rPr lang="en-IN" sz="2000" b="1" dirty="0">
+              <a:rPr lang="en-IN" sz="2000" b="1" dirty="0" smtClean="0">
                 <a:sym typeface="+mn-ea"/>
               </a:rPr>
               <a:t> </a:t>
@@ -3859,9 +3856,6 @@
               </a:rPr>
               <a:t>#2274        </a:t>
             </a:r>
-            <a:endParaRPr lang="en-IN" sz="2000" dirty="0">
-              <a:sym typeface="+mn-ea"/>
-            </a:endParaRPr>
           </a:p>
           <a:p>
             <a:pPr marL="0" indent="0" algn="l">
@@ -3911,6 +3905,12 @@
               <a:t> </a:t>
             </a:r>
             <a:r>
+              <a:rPr lang="en-IN" sz="2000" dirty="0" smtClean="0">
+                <a:sym typeface="+mn-ea"/>
+              </a:rPr>
+              <a:t> </a:t>
+            </a:r>
+            <a:r>
               <a:rPr lang="en-IN" sz="2000" dirty="0" err="1" smtClean="0">
                 <a:sym typeface="+mn-ea"/>
               </a:rPr>
@@ -3922,9 +3922,6 @@
               </a:rPr>
               <a:t>.</a:t>
             </a:r>
-            <a:endParaRPr lang="en-IN" sz="2000" dirty="0" smtClean="0">
-              <a:sym typeface="+mn-ea"/>
-            </a:endParaRPr>
           </a:p>
           <a:p>
             <a:pPr marL="0" indent="0" algn="ctr">
@@ -4024,6 +4021,7 @@
         </p:style>
         <p:txBody>
           <a:bodyPr rtlCol="0" anchor="ctr"/>
+          <a:lstStyle/>
           <a:p>
             <a:pPr algn="ctr"/>
             <a:r>
@@ -4051,7 +4049,7 @@
         <p:spPr>
           <a:xfrm>
             <a:off x="4673600" y="659452"/>
-            <a:ext cx="4673600" cy="704850"/>
+            <a:ext cx="4614091" cy="704850"/>
           </a:xfrm>
           <a:prstGeom prst="roundRect">
             <a:avLst/>
@@ -4085,6 +4083,7 @@
         </p:style>
         <p:txBody>
           <a:bodyPr rtlCol="0" anchor="ctr"/>
+          <a:lstStyle/>
           <a:p>
             <a:pPr algn="ctr"/>
             <a:r>
@@ -4146,6 +4145,7 @@
         </p:style>
         <p:txBody>
           <a:bodyPr rtlCol="0" anchor="ctr"/>
+          <a:lstStyle/>
           <a:p>
             <a:pPr algn="ctr"/>
             <a:r>
@@ -4154,7 +4154,23 @@
                   <a:schemeClr val="tx1"/>
                 </a:solidFill>
               </a:rPr>
-              <a:t>The farmer can now upload his product via SMS, Website, Call.</a:t>
+              <a:t>The farmer can now upload his product via </a:t>
+            </a:r>
+            <a:r>
+              <a:rPr lang="en-US" dirty="0" smtClean="0">
+                <a:solidFill>
+                  <a:schemeClr val="tx1"/>
+                </a:solidFill>
+              </a:rPr>
+              <a:t>SMS</a:t>
+            </a:r>
+            <a:r>
+              <a:rPr lang="en-US" dirty="0" smtClean="0">
+                <a:solidFill>
+                  <a:schemeClr val="tx1"/>
+                </a:solidFill>
+              </a:rPr>
+              <a:t>, Website, Call.</a:t>
             </a:r>
             <a:endParaRPr lang="en-US" dirty="0">
               <a:solidFill>
@@ -4172,7 +4188,7 @@
         </p:nvSpPr>
         <p:spPr>
           <a:xfrm>
-            <a:off x="7632700" y="2620370"/>
+            <a:off x="7413032" y="2660602"/>
             <a:ext cx="4673600" cy="618130"/>
           </a:xfrm>
           <a:prstGeom prst="roundRect">
@@ -4207,6 +4223,7 @@
         </p:style>
         <p:txBody>
           <a:bodyPr rtlCol="0" anchor="ctr"/>
+          <a:lstStyle/>
           <a:p>
             <a:pPr algn="ctr"/>
             <a:r>
@@ -4233,7 +4250,7 @@
         </p:nvSpPr>
         <p:spPr>
           <a:xfrm>
-            <a:off x="6819900" y="3501883"/>
+            <a:off x="6819900" y="3582328"/>
             <a:ext cx="4673600" cy="1054100"/>
           </a:xfrm>
           <a:prstGeom prst="roundRect">
@@ -4268,6 +4285,7 @@
         </p:style>
         <p:txBody>
           <a:bodyPr rtlCol="0" anchor="ctr"/>
+          <a:lstStyle/>
           <a:p>
             <a:pPr algn="ctr"/>
             <a:r>
@@ -4294,7 +4312,7 @@
         </p:nvSpPr>
         <p:spPr>
           <a:xfrm>
-            <a:off x="4959546" y="4853719"/>
+            <a:off x="5105712" y="4948455"/>
             <a:ext cx="4673600" cy="701154"/>
           </a:xfrm>
           <a:prstGeom prst="roundRect">
@@ -4329,6 +4347,7 @@
         </p:style>
         <p:txBody>
           <a:bodyPr rtlCol="0" anchor="ctr"/>
+          <a:lstStyle/>
           <a:p>
             <a:pPr algn="ctr"/>
             <a:r>
@@ -4355,7 +4374,7 @@
         </p:nvSpPr>
         <p:spPr>
           <a:xfrm>
-            <a:off x="191069" y="5660408"/>
+            <a:off x="191069" y="5506256"/>
             <a:ext cx="4673600" cy="1197591"/>
           </a:xfrm>
           <a:prstGeom prst="roundRect">
@@ -4390,6 +4409,7 @@
         </p:style>
         <p:txBody>
           <a:bodyPr rtlCol="0" anchor="ctr"/>
+          <a:lstStyle/>
           <a:p>
             <a:pPr algn="ctr"/>
             <a:r>
@@ -4401,12 +4421,12 @@
               <a:t>The farmer has to deposit his produce at the nearby government warehouse for packaging and </a:t>
             </a:r>
             <a:r>
-              <a:rPr lang="en-US" dirty="0" err="1" smtClean="0">
+              <a:rPr lang="en-US" dirty="0" smtClean="0">
                 <a:solidFill>
                   <a:schemeClr val="tx1"/>
                 </a:solidFill>
               </a:rPr>
-              <a:t>labelling</a:t>
+              <a:t>labeling</a:t>
             </a:r>
             <a:r>
               <a:rPr lang="en-US" dirty="0" smtClean="0">
@@ -4457,6 +4477,7 @@
         </p:style>
         <p:txBody>
           <a:bodyPr rtlCol="0" anchor="ctr"/>
+          <a:lstStyle/>
           <a:p>
             <a:pPr algn="ctr"/>
             <a:endParaRPr lang="en-US"/>
@@ -4496,6 +4517,7 @@
         </p:style>
         <p:txBody>
           <a:bodyPr rtlCol="0" anchor="ctr"/>
+          <a:lstStyle/>
           <a:p>
             <a:pPr algn="ctr"/>
             <a:endParaRPr lang="en-US"/>
@@ -4535,6 +4557,7 @@
         </p:style>
         <p:txBody>
           <a:bodyPr rtlCol="0" anchor="ctr"/>
+          <a:lstStyle/>
           <a:p>
             <a:pPr algn="ctr"/>
             <a:endParaRPr lang="en-US"/>
@@ -4549,7 +4572,7 @@
         </p:nvSpPr>
         <p:spPr>
           <a:xfrm>
-            <a:off x="9392103" y="3193580"/>
+            <a:off x="9628562" y="3294800"/>
             <a:ext cx="241043" cy="308303"/>
           </a:xfrm>
           <a:prstGeom prst="downArrow">
@@ -4574,6 +4597,7 @@
         </p:style>
         <p:txBody>
           <a:bodyPr rtlCol="0" anchor="ctr"/>
+          <a:lstStyle/>
           <a:p>
             <a:pPr algn="ctr"/>
             <a:endParaRPr lang="en-US"/>
@@ -4588,7 +4612,7 @@
         </p:nvSpPr>
         <p:spPr>
           <a:xfrm>
-            <a:off x="7499821" y="4506893"/>
+            <a:off x="8684592" y="4615653"/>
             <a:ext cx="241043" cy="308303"/>
           </a:xfrm>
           <a:prstGeom prst="downArrow">
@@ -4613,6 +4637,7 @@
         </p:style>
         <p:txBody>
           <a:bodyPr rtlCol="0" anchor="ctr"/>
+          <a:lstStyle/>
           <a:p>
             <a:pPr algn="ctr"/>
             <a:endParaRPr lang="en-US"/>
@@ -4627,7 +4652,7 @@
         </p:nvSpPr>
         <p:spPr>
           <a:xfrm>
-            <a:off x="2527869" y="5352105"/>
+            <a:off x="2472248" y="5197953"/>
             <a:ext cx="241043" cy="308303"/>
           </a:xfrm>
           <a:prstGeom prst="downArrow">
@@ -4652,6 +4677,7 @@
         </p:style>
         <p:txBody>
           <a:bodyPr rtlCol="0" anchor="ctr"/>
+          <a:lstStyle/>
           <a:p>
             <a:pPr algn="ctr"/>
             <a:endParaRPr lang="en-US"/>
@@ -4666,7 +4692,7 @@
         </p:nvSpPr>
         <p:spPr>
           <a:xfrm>
-            <a:off x="491319" y="1997596"/>
+            <a:off x="508000" y="2380491"/>
             <a:ext cx="4039738" cy="1796482"/>
           </a:xfrm>
           <a:prstGeom prst="ellipse">
@@ -4694,13 +4720,18 @@
         </p:style>
         <p:txBody>
           <a:bodyPr rtlCol="0" anchor="ctr"/>
+          <a:lstStyle/>
           <a:p>
             <a:pPr algn="ctr"/>
             <a:r>
-              <a:rPr lang="en-US" sz="2400" dirty="0" smtClean="0"/>
-              <a:t>FARMER </a:t>
-            </a:r>
-            <a:endParaRPr lang="en-US" sz="2400" dirty="0"/>
+              <a:rPr lang="en-US" sz="2400" b="1" dirty="0" smtClean="0">
+                <a:latin typeface="Berlin Sans FB Demi" panose="020E0802020502020306" pitchFamily="34" charset="0"/>
+              </a:rPr>
+              <a:t>FARMER SOLUTION </a:t>
+            </a:r>
+            <a:endParaRPr lang="en-US" sz="2400" b="1" dirty="0">
+              <a:latin typeface="Berlin Sans FB Demi" panose="020E0802020502020306" pitchFamily="34" charset="0"/>
+            </a:endParaRPr>
           </a:p>
         </p:txBody>
       </p:sp>
@@ -4924,8 +4955,8 @@
         </p:nvSpPr>
         <p:spPr>
           <a:xfrm>
-            <a:off x="8446395" y="1017432"/>
-            <a:ext cx="3193960" cy="1107583"/>
+            <a:off x="8747546" y="1483770"/>
+            <a:ext cx="3166485" cy="1107583"/>
           </a:xfrm>
           <a:prstGeom prst="cloud">
             <a:avLst/>
@@ -5003,7 +5034,6 @@
               <a:rPr lang="en-IN" dirty="0"/>
               <a:t> (Order once, product will  be delivered for the specified duration). Government warehouses available for storage to reduce the repeated delivery charges. </a:t>
             </a:r>
-            <a:endParaRPr lang="en-IN" dirty="0"/>
           </a:p>
         </p:txBody>
       </p:sp>
@@ -5051,7 +5081,6 @@
               <a:rPr lang="en-IN" dirty="0"/>
               <a:t> (buyer prefers a farmer, he will be notified every time the farmer uploads).</a:t>
             </a:r>
-            <a:endParaRPr lang="en-IN" dirty="0"/>
           </a:p>
           <a:p>
             <a:pPr algn="ctr"/>
@@ -5099,7 +5128,6 @@
               <a:rPr lang="en-US" sz="2400" b="1" dirty="0" smtClean="0"/>
               <a:t>BUYER </a:t>
             </a:r>
-            <a:endParaRPr lang="en-US" sz="2400" b="1" dirty="0" smtClean="0"/>
           </a:p>
           <a:p>
             <a:pPr algn="ctr"/>
@@ -5296,7 +5324,7 @@
         </p:nvSpPr>
         <p:spPr>
           <a:xfrm>
-            <a:off x="2632855" y="246846"/>
+            <a:off x="2244422" y="535637"/>
             <a:ext cx="2290293" cy="1107583"/>
           </a:xfrm>
           <a:prstGeom prst="cloud">
@@ -5412,7 +5440,7 @@
         <p:spPr>
           <a:xfrm>
             <a:off x="7101316" y="1483770"/>
-            <a:ext cx="1354986" cy="87454"/>
+            <a:ext cx="1656052" cy="553792"/>
           </a:xfrm>
           <a:prstGeom prst="straightConnector1">
             <a:avLst/>
@@ -5444,7 +5472,7 @@
         </p:nvSpPr>
         <p:spPr>
           <a:xfrm>
-            <a:off x="6729181" y="0"/>
+            <a:off x="7101316" y="528120"/>
             <a:ext cx="2099256" cy="1107583"/>
           </a:xfrm>
           <a:prstGeom prst="cloud">
@@ -5476,7 +5504,6 @@
               <a:rPr lang="en-US" b="1" dirty="0" smtClean="0"/>
               <a:t>Notification</a:t>
             </a:r>
-            <a:endParaRPr lang="en-US" b="1" dirty="0" smtClean="0"/>
           </a:p>
           <a:p>
             <a:pPr algn="ctr"/>
@@ -5488,7 +5515,6 @@
               <a:rPr lang="en-US" b="1" dirty="0"/>
               <a:t>m</a:t>
             </a:r>
-            <a:endParaRPr lang="en-US" b="1" dirty="0"/>
           </a:p>
         </p:txBody>
       </p:sp>
@@ -5525,6 +5551,37 @@
           </a:fontRef>
         </p:style>
       </p:cxnSp>
+      <p:sp>
+        <p:nvSpPr>
+          <p:cNvPr id="12" name="TextBox 11"/>
+          <p:cNvSpPr txBox="1"/>
+          <p:nvPr/>
+        </p:nvSpPr>
+        <p:spPr>
+          <a:xfrm>
+            <a:off x="137374" y="50443"/>
+            <a:ext cx="11776657" cy="369332"/>
+          </a:xfrm>
+          <a:prstGeom prst="rect">
+            <a:avLst/>
+          </a:prstGeom>
+          <a:noFill/>
+        </p:spPr>
+        <p:txBody>
+          <a:bodyPr wrap="square" rtlCol="0">
+            <a:spAutoFit/>
+          </a:bodyPr>
+          <a:lstStyle/>
+          <a:p>
+            <a:pPr algn="ctr"/>
+            <a:r>
+              <a:rPr lang="en-IN" b="1" dirty="0" smtClean="0"/>
+              <a:t>THE BUYER CAN PURCHASE PRODUCTS ONLINE FROM THE PORTAL.</a:t>
+            </a:r>
+            <a:endParaRPr lang="en-US" b="1" dirty="0"/>
+          </a:p>
+        </p:txBody>
+      </p:sp>
     </p:spTree>
   </p:cSld>
   <p:clrMapOvr>
@@ -5637,7 +5694,6 @@
               <a:rPr lang="en-IN" sz="1700" dirty="0" smtClean="0"/>
               <a:t>his order.</a:t>
             </a:r>
-            <a:endParaRPr lang="en-IN" sz="1700" dirty="0" smtClean="0"/>
           </a:p>
           <a:p>
             <a:pPr marL="285750" indent="-285750">
@@ -5671,7 +5727,6 @@
               <a:rPr lang="en-IN" sz="1700" dirty="0" smtClean="0"/>
               <a:t>/ quintal) for packaging and labelling. </a:t>
             </a:r>
-            <a:endParaRPr lang="en-IN" sz="1700" dirty="0" smtClean="0"/>
           </a:p>
           <a:p>
             <a:pPr marL="285750" indent="-285750">
@@ -5697,7 +5752,6 @@
               <a:rPr lang="en-IN" sz="1700" dirty="0" smtClean="0"/>
               <a:t>, package it and then label it.</a:t>
             </a:r>
-            <a:endParaRPr lang="en-IN" sz="1700" dirty="0" smtClean="0"/>
           </a:p>
           <a:p>
             <a:pPr marL="285750" indent="-285750">
@@ -5721,7 +5775,11 @@
             </a:r>
             <a:r>
               <a:rPr lang="en-IN" sz="1700" dirty="0" smtClean="0"/>
-              <a:t> from here or the farmer can now deliver his product.</a:t>
+              <a:t> from here or the farmer can now deliver his </a:t>
+            </a:r>
+            <a:r>
+              <a:rPr lang="en-IN" sz="1700" dirty="0" smtClean="0"/>
+              <a:t>product and the buyer can track his delivery.</a:t>
             </a:r>
             <a:endParaRPr lang="en-IN" sz="1700" dirty="0" smtClean="0"/>
           </a:p>
@@ -5745,7 +5803,6 @@
               <a:rPr lang="en-IN" sz="1700" dirty="0" smtClean="0"/>
               <a:t> (covers all regions in India) are available for delivery in the portal.</a:t>
             </a:r>
-            <a:endParaRPr lang="en-IN" sz="1700" dirty="0" smtClean="0"/>
           </a:p>
         </p:txBody>
       </p:sp>
@@ -5791,11 +5848,6 @@
               </a:rPr>
               <a:t>:- Big Data , Data Analytics , Visualization, Machine learning .</a:t>
             </a:r>
-            <a:endParaRPr lang="en-IN" sz="1700" dirty="0">
-              <a:latin typeface="Calibri" panose="020F0502020204030204" pitchFamily="34" charset="0"/>
-              <a:cs typeface="Calibri" panose="020F0502020204030204" pitchFamily="34" charset="0"/>
-              <a:sym typeface="+mn-ea"/>
-            </a:endParaRPr>
           </a:p>
           <a:p>
             <a:pPr marL="171450" indent="-171450" algn="l">
@@ -5810,7 +5862,6 @@
               <a:rPr lang="en-IN" sz="1700" dirty="0"/>
               <a:t>:-Android Studio, Android SDK and Jellybean version and above.</a:t>
             </a:r>
-            <a:endParaRPr lang="en-IN" sz="1700" dirty="0"/>
           </a:p>
           <a:p>
             <a:pPr marL="171450" indent="-171450" algn="l">
@@ -5905,7 +5956,13 @@
               <a:rPr lang="en-IN" sz="1700" dirty="0">
                 <a:sym typeface="+mn-ea"/>
               </a:rPr>
-              <a:t>  </a:t>
+              <a:t> </a:t>
+            </a:r>
+            <a:r>
+              <a:rPr lang="en-IN" sz="1700" dirty="0" smtClean="0">
+                <a:sym typeface="+mn-ea"/>
+              </a:rPr>
+              <a:t>.</a:t>
             </a:r>
             <a:endParaRPr lang="en-IN" sz="1700" dirty="0">
               <a:sym typeface="+mn-ea"/>
@@ -6185,31 +6242,6 @@
               </a:rPr>
               <a:t>AGROCRAFT</a:t>
             </a:r>
-            <a:endParaRPr lang="en-IN" altLang="en-US" sz="2000" b="1" i="1" u="sng" dirty="0" err="1">
-              <a:ln w="0"/>
-              <a:gradFill>
-                <a:gsLst>
-                  <a:gs pos="0">
-                    <a:schemeClr val="accent5">
-                      <a:lumMod val="50000"/>
-                    </a:schemeClr>
-                  </a:gs>
-                  <a:gs pos="50000">
-                    <a:schemeClr val="accent5"/>
-                  </a:gs>
-                  <a:gs pos="100000">
-                    <a:schemeClr val="accent5">
-                      <a:lumMod val="60000"/>
-                      <a:lumOff val="40000"/>
-                    </a:schemeClr>
-                  </a:gs>
-                </a:gsLst>
-                <a:lin ang="5400000"/>
-              </a:gradFill>
-              <a:effectLst>
-                <a:reflection blurRad="6350" stA="53000" endA="300" endPos="35500" dir="5400000" sy="-90000" algn="bl" rotWithShape="0"/>
-              </a:effectLst>
-            </a:endParaRPr>
           </a:p>
         </p:txBody>
       </p:sp>
@@ -6222,7 +6254,7 @@
           <p:nvPr/>
         </p:nvPicPr>
         <p:blipFill>
-          <a:blip r:embed="rId1"/>
+          <a:blip r:embed="rId3"/>
           <a:stretch>
             <a:fillRect/>
           </a:stretch>
@@ -6256,6 +6288,7 @@
           <a:bodyPr wrap="none">
             <a:spAutoFit/>
           </a:bodyPr>
+          <a:lstStyle/>
           <a:p>
             <a:pPr algn="ctr"/>
             <a:r>
@@ -6286,31 +6319,6 @@
               </a:rPr>
               <a:t>DELIVERY AND QUALITY VERIFICATION</a:t>
             </a:r>
-            <a:endParaRPr lang="en-IN" altLang="en-US" sz="2000" b="1" i="1" u="sng" dirty="0">
-              <a:ln w="0"/>
-              <a:gradFill>
-                <a:gsLst>
-                  <a:gs pos="0">
-                    <a:schemeClr val="accent5">
-                      <a:lumMod val="50000"/>
-                    </a:schemeClr>
-                  </a:gs>
-                  <a:gs pos="50000">
-                    <a:schemeClr val="accent5"/>
-                  </a:gs>
-                  <a:gs pos="100000">
-                    <a:schemeClr val="accent5">
-                      <a:lumMod val="60000"/>
-                      <a:lumOff val="40000"/>
-                    </a:schemeClr>
-                  </a:gs>
-                </a:gsLst>
-                <a:lin ang="5400000"/>
-              </a:gradFill>
-              <a:effectLst>
-                <a:reflection blurRad="6350" stA="53000" endA="300" endPos="35500" dir="5400000" sy="-90000" algn="bl" rotWithShape="0"/>
-              </a:effectLst>
-            </a:endParaRPr>
           </a:p>
         </p:txBody>
       </p:sp>
@@ -6333,6 +6341,7 @@
           <a:bodyPr wrap="none">
             <a:spAutoFit/>
           </a:bodyPr>
+          <a:lstStyle/>
           <a:p>
             <a:pPr algn="ctr"/>
             <a:r>
@@ -6363,31 +6372,6 @@
               </a:rPr>
               <a:t>TECHNOLOGY STACK</a:t>
             </a:r>
-            <a:endParaRPr lang="en-IN" altLang="en-US" sz="2000" b="1" i="1" u="sng" dirty="0" err="1">
-              <a:ln w="0"/>
-              <a:gradFill>
-                <a:gsLst>
-                  <a:gs pos="0">
-                    <a:schemeClr val="accent5">
-                      <a:lumMod val="50000"/>
-                    </a:schemeClr>
-                  </a:gs>
-                  <a:gs pos="50000">
-                    <a:schemeClr val="accent5"/>
-                  </a:gs>
-                  <a:gs pos="100000">
-                    <a:schemeClr val="accent5">
-                      <a:lumMod val="60000"/>
-                      <a:lumOff val="40000"/>
-                    </a:schemeClr>
-                  </a:gs>
-                </a:gsLst>
-                <a:lin ang="5400000"/>
-              </a:gradFill>
-              <a:effectLst>
-                <a:reflection blurRad="6350" stA="53000" endA="300" endPos="35500" dir="5400000" sy="-90000" algn="bl" rotWithShape="0"/>
-              </a:effectLst>
-            </a:endParaRPr>
           </a:p>
         </p:txBody>
       </p:sp>
@@ -6477,30 +6461,6 @@
               </a:rPr>
               <a:t>USE CASE </a:t>
             </a:r>
-            <a:endParaRPr lang="en-US" b="1" i="1" u="sng">
-              <a:gradFill>
-                <a:gsLst>
-                  <a:gs pos="0">
-                    <a:schemeClr val="accent5">
-                      <a:lumMod val="50000"/>
-                    </a:schemeClr>
-                  </a:gs>
-                  <a:gs pos="50000">
-                    <a:schemeClr val="accent5"/>
-                  </a:gs>
-                  <a:gs pos="100000">
-                    <a:schemeClr val="accent5">
-                      <a:lumMod val="60000"/>
-                      <a:lumOff val="40000"/>
-                    </a:schemeClr>
-                  </a:gs>
-                </a:gsLst>
-                <a:lin ang="5400000"/>
-              </a:gradFill>
-              <a:effectLst>
-                <a:reflection blurRad="6350" stA="53000" endA="300" endPos="35500" dir="5400000" sy="-90000" algn="bl" rotWithShape="0"/>
-              </a:effectLst>
-            </a:endParaRPr>
           </a:p>
         </p:txBody>
       </p:sp>
@@ -6555,31 +6515,6 @@
               </a:rPr>
               <a:t>DEPENDENCIES</a:t>
             </a:r>
-            <a:endParaRPr lang="en-IN" b="1" u="sng" dirty="0">
-              <a:gradFill>
-                <a:gsLst>
-                  <a:gs pos="0">
-                    <a:schemeClr val="accent5">
-                      <a:lumMod val="50000"/>
-                    </a:schemeClr>
-                  </a:gs>
-                  <a:gs pos="50000">
-                    <a:schemeClr val="accent5"/>
-                  </a:gs>
-                  <a:gs pos="100000">
-                    <a:schemeClr val="accent5">
-                      <a:lumMod val="60000"/>
-                      <a:lumOff val="40000"/>
-                    </a:schemeClr>
-                  </a:gs>
-                </a:gsLst>
-                <a:lin ang="5400000"/>
-              </a:gradFill>
-              <a:effectLst>
-                <a:reflection blurRad="6350" stA="53000" endA="300" endPos="35500" dir="5400000" sy="-90000" algn="bl" rotWithShape="0"/>
-              </a:effectLst>
-              <a:sym typeface="+mn-ea"/>
-            </a:endParaRPr>
           </a:p>
           <a:p>
             <a:pPr algn="ctr"/>
@@ -6716,9 +6651,6 @@
               </a:rPr>
               <a:t> </a:t>
             </a:r>
-            <a:endParaRPr lang="en-IN" b="1" dirty="0">
-              <a:sym typeface="+mn-ea"/>
-            </a:endParaRPr>
           </a:p>
           <a:p>
             <a:pPr algn="ctr"/>
@@ -6747,9 +6679,6 @@
               </a:rPr>
               <a:t>has been designed.</a:t>
             </a:r>
-            <a:endParaRPr lang="en-IN" dirty="0" smtClean="0">
-              <a:sym typeface="+mn-ea"/>
-            </a:endParaRPr>
           </a:p>
           <a:p>
             <a:pPr marL="285750" indent="-285750">
@@ -6802,53 +6731,44 @@
               <a:rPr lang="en-IN" b="1" dirty="0" smtClean="0">
                 <a:sym typeface="+mn-ea"/>
               </a:rPr>
-              <a:t>B</a:t>
+              <a:t>Buyer</a:t>
+            </a:r>
+            <a:r>
+              <a:rPr lang="en-IN" dirty="0" smtClean="0">
+                <a:sym typeface="+mn-ea"/>
+              </a:rPr>
+              <a:t> </a:t>
+            </a:r>
+            <a:r>
+              <a:rPr lang="en-IN" b="1" dirty="0">
+                <a:sym typeface="+mn-ea"/>
+              </a:rPr>
+              <a:t>profits </a:t>
             </a:r>
             <a:r>
               <a:rPr lang="en-IN" b="1" dirty="0" smtClean="0">
                 <a:sym typeface="+mn-ea"/>
               </a:rPr>
-              <a:t>uyer</a:t>
+              <a:t> - </a:t>
             </a:r>
             <a:r>
               <a:rPr lang="en-IN" dirty="0" smtClean="0">
                 <a:sym typeface="+mn-ea"/>
               </a:rPr>
-              <a:t> </a:t>
-            </a:r>
-            <a:r>
-              <a:rPr lang="en-IN" b="1" dirty="0">
-                <a:sym typeface="+mn-ea"/>
-              </a:rPr>
-              <a:t>profits </a:t>
-            </a:r>
-            <a:r>
-              <a:rPr lang="en-IN" b="1" dirty="0" smtClean="0">
-                <a:sym typeface="+mn-ea"/>
-              </a:rPr>
-              <a:t> - </a:t>
+              <a:t>buy </a:t>
+            </a:r>
+            <a:r>
+              <a:rPr lang="en-IN" dirty="0">
+                <a:sym typeface="+mn-ea"/>
+              </a:rPr>
+              <a:t>at cheaper </a:t>
             </a:r>
             <a:r>
               <a:rPr lang="en-IN" dirty="0" smtClean="0">
                 <a:sym typeface="+mn-ea"/>
               </a:rPr>
-              <a:t>buy </a:t>
-            </a:r>
-            <a:r>
-              <a:rPr lang="en-IN" dirty="0">
-                <a:sym typeface="+mn-ea"/>
-              </a:rPr>
-              <a:t>at cheaper </a:t>
-            </a:r>
-            <a:r>
-              <a:rPr lang="en-IN" dirty="0" smtClean="0">
-                <a:sym typeface="+mn-ea"/>
-              </a:rPr>
               <a:t>rates</a:t>
             </a:r>
-            <a:endParaRPr lang="en-IN" dirty="0" smtClean="0">
-              <a:sym typeface="+mn-ea"/>
-            </a:endParaRPr>
           </a:p>
           <a:p>
             <a:pPr marL="285750" indent="-285750">
@@ -6859,13 +6779,7 @@
               <a:rPr lang="en-IN" b="1" dirty="0" smtClean="0">
                 <a:sym typeface="+mn-ea"/>
               </a:rPr>
-              <a:t>T</a:t>
-            </a:r>
-            <a:r>
-              <a:rPr lang="en-IN" b="1" dirty="0" smtClean="0">
-                <a:sym typeface="+mn-ea"/>
-              </a:rPr>
-              <a:t>ransport systems  profit</a:t>
+              <a:t>Transport systems  profit</a:t>
             </a:r>
             <a:r>
               <a:rPr lang="en-IN" dirty="0" smtClean="0">
@@ -6885,9 +6799,6 @@
               </a:rPr>
               <a:t>.</a:t>
             </a:r>
-            <a:endParaRPr lang="en-IN" dirty="0" smtClean="0">
-              <a:sym typeface="+mn-ea"/>
-            </a:endParaRPr>
           </a:p>
           <a:p>
             <a:pPr marL="285750" indent="-285750">
@@ -6931,9 +6842,6 @@
               </a:rPr>
               <a:t> anymore.</a:t>
             </a:r>
-            <a:endParaRPr lang="en-IN" dirty="0" smtClean="0">
-              <a:sym typeface="+mn-ea"/>
-            </a:endParaRPr>
           </a:p>
           <a:p>
             <a:pPr marL="285750" indent="-285750">
@@ -6961,9 +6869,6 @@
               </a:rPr>
               <a:t>and they can negotiate using the chat system/call.</a:t>
             </a:r>
-            <a:endParaRPr lang="en-IN" dirty="0" smtClean="0">
-              <a:sym typeface="+mn-ea"/>
-            </a:endParaRPr>
           </a:p>
           <a:p>
             <a:pPr marL="285750" indent="-285750">
@@ -6978,23 +6883,28 @@
       </p:sp>
       <p:pic>
         <p:nvPicPr>
-          <p:cNvPr id="7" name="Picture 6" descr="C:\xampp\htdocs\AgroCraft-PHP\Documents\flow use case .pngflow use case "/>
+          <p:cNvPr id="2" name="Picture 1"/>
           <p:cNvPicPr>
             <a:picLocks noChangeAspect="1"/>
           </p:cNvPicPr>
           <p:nvPr/>
         </p:nvPicPr>
         <p:blipFill>
-          <a:blip r:embed="rId1"/>
-          <a:srcRect t="282" b="-35"/>
+          <a:blip r:embed="rId3">
+            <a:extLst>
+              <a:ext uri="{28A0092B-C50C-407E-A947-70E740481C1C}">
+                <a14:useLocalDpi xmlns:a14="http://schemas.microsoft.com/office/drawing/2010/main" val="0"/>
+              </a:ext>
+            </a:extLst>
+          </a:blip>
           <a:stretch>
             <a:fillRect/>
           </a:stretch>
         </p:blipFill>
         <p:spPr>
           <a:xfrm>
-            <a:off x="88900" y="489585"/>
-            <a:ext cx="6255385" cy="6399530"/>
+            <a:off x="130629" y="489586"/>
+            <a:ext cx="6214291" cy="6368414"/>
           </a:xfrm>
           <a:prstGeom prst="rect">
             <a:avLst/>
@@ -7267,6 +7177,8 @@
       </a:bgFillStyleLst>
     </a:fmtScheme>
   </a:themeElements>
+  <a:objectDefaults/>
+  <a:extraClrSchemeLst/>
   <a:extLst>
     <a:ext uri="{05A4C25C-085E-4340-85A3-A5531E510DB2}">
       <thm15:themeFamily xmlns:thm15="http://schemas.microsoft.com/office/thememl/2012/main" name="Office Theme" id="{62F939B6-93AF-4DB8-9C6B-D6C7DFDC589F}" vid="{4A3C46E8-61CC-4603-A589-7422A47A8E4A}"/>
@@ -7526,6 +7438,8 @@
       </a:bgFillStyleLst>
     </a:fmtScheme>
   </a:themeElements>
+  <a:objectDefaults/>
+  <a:extraClrSchemeLst/>
   <a:extLst>
     <a:ext uri="{05A4C25C-085E-4340-85A3-A5531E510DB2}">
       <thm15:themeFamily xmlns:thm15="http://schemas.microsoft.com/office/thememl/2012/main" name="Office Theme" id="{62F939B6-93AF-4DB8-9C6B-D6C7DFDC589F}" vid="{4A3C46E8-61CC-4603-A589-7422A47A8E4A}"/>

</xml_diff>